<commit_message>
Divided class in folder akin to their use and added a check for capitol letters in passwordchecker, furthermore updated documentation
</commit_message>
<xml_diff>
--- a/Documentation/Class diagram.pptx
+++ b/Documentation/Class diagram.pptx
@@ -264,7 +264,7 @@
           <a:p>
             <a:fld id="{F03EF477-0A65-48AB-937D-ED42217D2BDA}" type="datetimeFigureOut">
               <a:rPr lang="it-IT" smtClean="0"/>
-              <a:t>17/07/2022</a:t>
+              <a:t>21/07/2022</a:t>
             </a:fld>
             <a:endParaRPr lang="it-IT"/>
           </a:p>
@@ -462,7 +462,7 @@
           <a:p>
             <a:fld id="{F03EF477-0A65-48AB-937D-ED42217D2BDA}" type="datetimeFigureOut">
               <a:rPr lang="it-IT" smtClean="0"/>
-              <a:t>17/07/2022</a:t>
+              <a:t>21/07/2022</a:t>
             </a:fld>
             <a:endParaRPr lang="it-IT"/>
           </a:p>
@@ -670,7 +670,7 @@
           <a:p>
             <a:fld id="{F03EF477-0A65-48AB-937D-ED42217D2BDA}" type="datetimeFigureOut">
               <a:rPr lang="it-IT" smtClean="0"/>
-              <a:t>17/07/2022</a:t>
+              <a:t>21/07/2022</a:t>
             </a:fld>
             <a:endParaRPr lang="it-IT"/>
           </a:p>
@@ -868,7 +868,7 @@
           <a:p>
             <a:fld id="{F03EF477-0A65-48AB-937D-ED42217D2BDA}" type="datetimeFigureOut">
               <a:rPr lang="it-IT" smtClean="0"/>
-              <a:t>17/07/2022</a:t>
+              <a:t>21/07/2022</a:t>
             </a:fld>
             <a:endParaRPr lang="it-IT"/>
           </a:p>
@@ -1143,7 +1143,7 @@
           <a:p>
             <a:fld id="{F03EF477-0A65-48AB-937D-ED42217D2BDA}" type="datetimeFigureOut">
               <a:rPr lang="it-IT" smtClean="0"/>
-              <a:t>17/07/2022</a:t>
+              <a:t>21/07/2022</a:t>
             </a:fld>
             <a:endParaRPr lang="it-IT"/>
           </a:p>
@@ -1408,7 +1408,7 @@
           <a:p>
             <a:fld id="{F03EF477-0A65-48AB-937D-ED42217D2BDA}" type="datetimeFigureOut">
               <a:rPr lang="it-IT" smtClean="0"/>
-              <a:t>17/07/2022</a:t>
+              <a:t>21/07/2022</a:t>
             </a:fld>
             <a:endParaRPr lang="it-IT"/>
           </a:p>
@@ -1820,7 +1820,7 @@
           <a:p>
             <a:fld id="{F03EF477-0A65-48AB-937D-ED42217D2BDA}" type="datetimeFigureOut">
               <a:rPr lang="it-IT" smtClean="0"/>
-              <a:t>17/07/2022</a:t>
+              <a:t>21/07/2022</a:t>
             </a:fld>
             <a:endParaRPr lang="it-IT"/>
           </a:p>
@@ -1961,7 +1961,7 @@
           <a:p>
             <a:fld id="{F03EF477-0A65-48AB-937D-ED42217D2BDA}" type="datetimeFigureOut">
               <a:rPr lang="it-IT" smtClean="0"/>
-              <a:t>17/07/2022</a:t>
+              <a:t>21/07/2022</a:t>
             </a:fld>
             <a:endParaRPr lang="it-IT"/>
           </a:p>
@@ -2074,7 +2074,7 @@
           <a:p>
             <a:fld id="{F03EF477-0A65-48AB-937D-ED42217D2BDA}" type="datetimeFigureOut">
               <a:rPr lang="it-IT" smtClean="0"/>
-              <a:t>17/07/2022</a:t>
+              <a:t>21/07/2022</a:t>
             </a:fld>
             <a:endParaRPr lang="it-IT"/>
           </a:p>
@@ -2385,7 +2385,7 @@
           <a:p>
             <a:fld id="{F03EF477-0A65-48AB-937D-ED42217D2BDA}" type="datetimeFigureOut">
               <a:rPr lang="it-IT" smtClean="0"/>
-              <a:t>17/07/2022</a:t>
+              <a:t>21/07/2022</a:t>
             </a:fld>
             <a:endParaRPr lang="it-IT"/>
           </a:p>
@@ -2673,7 +2673,7 @@
           <a:p>
             <a:fld id="{F03EF477-0A65-48AB-937D-ED42217D2BDA}" type="datetimeFigureOut">
               <a:rPr lang="it-IT" smtClean="0"/>
-              <a:t>17/07/2022</a:t>
+              <a:t>21/07/2022</a:t>
             </a:fld>
             <a:endParaRPr lang="it-IT"/>
           </a:p>
@@ -2914,7 +2914,7 @@
           <a:p>
             <a:fld id="{F03EF477-0A65-48AB-937D-ED42217D2BDA}" type="datetimeFigureOut">
               <a:rPr lang="it-IT" smtClean="0"/>
-              <a:t>17/07/2022</a:t>
+              <a:t>21/07/2022</a:t>
             </a:fld>
             <a:endParaRPr lang="it-IT"/>
           </a:p>
@@ -6411,14 +6411,14 @@
           <p:nvPr>
             <p:extLst>
               <p:ext uri="{D42A27DB-BD31-4B8C-83A1-F6EECF244321}">
-                <p14:modId xmlns:p14="http://schemas.microsoft.com/office/powerpoint/2010/main" val="3139033206"/>
+                <p14:modId xmlns:p14="http://schemas.microsoft.com/office/powerpoint/2010/main" val="3885511217"/>
               </p:ext>
             </p:extLst>
           </p:nvPr>
         </p:nvGraphicFramePr>
         <p:xfrm>
           <a:off x="457200" y="342858"/>
-          <a:ext cx="4662415" cy="2468880"/>
+          <a:ext cx="4662415" cy="2682240"/>
         </p:xfrm>
         <a:graphic>
           <a:graphicData uri="http://schemas.openxmlformats.org/drawingml/2006/table">
@@ -6601,6 +6601,17 @@
                         <a:rPr lang="da-DK" sz="1400" dirty="0"/>
                         <a:t>checkAlphabet(String, int) return boolean;</a:t>
                       </a:r>
+                    </a:p>
+                    <a:p>
+                      <a:pPr marL="285750" indent="-285750">
+                        <a:buFontTx/>
+                        <a:buChar char="-"/>
+                      </a:pPr>
+                      <a:r>
+                        <a:rPr lang="da-DK" sz="1400"/>
+                        <a:t>checkCapitalAlphabet(String, int) return boolean;</a:t>
+                      </a:r>
+                      <a:endParaRPr lang="da-DK" sz="1400" dirty="0"/>
                     </a:p>
                     <a:p>
                       <a:pPr marL="285750" indent="-285750">

</xml_diff>

<commit_message>
Reworked the app to allow a better isolate the GUI from the rest and improved the test
</commit_message>
<xml_diff>
--- a/Documentation/Class diagram.pptx
+++ b/Documentation/Class diagram.pptx
@@ -10,7 +10,8 @@
     <p:sldId id="257" r:id="rId4"/>
     <p:sldId id="258" r:id="rId5"/>
     <p:sldId id="259" r:id="rId6"/>
-    <p:sldId id="260" r:id="rId7"/>
+    <p:sldId id="262" r:id="rId7"/>
+    <p:sldId id="260" r:id="rId8"/>
   </p:sldIdLst>
   <p:sldSz cx="12192000" cy="6858000"/>
   <p:notesSz cx="6858000" cy="9144000"/>
@@ -264,7 +265,7 @@
           <a:p>
             <a:fld id="{F03EF477-0A65-48AB-937D-ED42217D2BDA}" type="datetimeFigureOut">
               <a:rPr lang="it-IT" smtClean="0"/>
-              <a:t>21/07/2022</a:t>
+              <a:t>30/08/2022</a:t>
             </a:fld>
             <a:endParaRPr lang="it-IT"/>
           </a:p>
@@ -462,7 +463,7 @@
           <a:p>
             <a:fld id="{F03EF477-0A65-48AB-937D-ED42217D2BDA}" type="datetimeFigureOut">
               <a:rPr lang="it-IT" smtClean="0"/>
-              <a:t>21/07/2022</a:t>
+              <a:t>30/08/2022</a:t>
             </a:fld>
             <a:endParaRPr lang="it-IT"/>
           </a:p>
@@ -670,7 +671,7 @@
           <a:p>
             <a:fld id="{F03EF477-0A65-48AB-937D-ED42217D2BDA}" type="datetimeFigureOut">
               <a:rPr lang="it-IT" smtClean="0"/>
-              <a:t>21/07/2022</a:t>
+              <a:t>30/08/2022</a:t>
             </a:fld>
             <a:endParaRPr lang="it-IT"/>
           </a:p>
@@ -868,7 +869,7 @@
           <a:p>
             <a:fld id="{F03EF477-0A65-48AB-937D-ED42217D2BDA}" type="datetimeFigureOut">
               <a:rPr lang="it-IT" smtClean="0"/>
-              <a:t>21/07/2022</a:t>
+              <a:t>30/08/2022</a:t>
             </a:fld>
             <a:endParaRPr lang="it-IT"/>
           </a:p>
@@ -1143,7 +1144,7 @@
           <a:p>
             <a:fld id="{F03EF477-0A65-48AB-937D-ED42217D2BDA}" type="datetimeFigureOut">
               <a:rPr lang="it-IT" smtClean="0"/>
-              <a:t>21/07/2022</a:t>
+              <a:t>30/08/2022</a:t>
             </a:fld>
             <a:endParaRPr lang="it-IT"/>
           </a:p>
@@ -1408,7 +1409,7 @@
           <a:p>
             <a:fld id="{F03EF477-0A65-48AB-937D-ED42217D2BDA}" type="datetimeFigureOut">
               <a:rPr lang="it-IT" smtClean="0"/>
-              <a:t>21/07/2022</a:t>
+              <a:t>30/08/2022</a:t>
             </a:fld>
             <a:endParaRPr lang="it-IT"/>
           </a:p>
@@ -1820,7 +1821,7 @@
           <a:p>
             <a:fld id="{F03EF477-0A65-48AB-937D-ED42217D2BDA}" type="datetimeFigureOut">
               <a:rPr lang="it-IT" smtClean="0"/>
-              <a:t>21/07/2022</a:t>
+              <a:t>30/08/2022</a:t>
             </a:fld>
             <a:endParaRPr lang="it-IT"/>
           </a:p>
@@ -1961,7 +1962,7 @@
           <a:p>
             <a:fld id="{F03EF477-0A65-48AB-937D-ED42217D2BDA}" type="datetimeFigureOut">
               <a:rPr lang="it-IT" smtClean="0"/>
-              <a:t>21/07/2022</a:t>
+              <a:t>30/08/2022</a:t>
             </a:fld>
             <a:endParaRPr lang="it-IT"/>
           </a:p>
@@ -2074,7 +2075,7 @@
           <a:p>
             <a:fld id="{F03EF477-0A65-48AB-937D-ED42217D2BDA}" type="datetimeFigureOut">
               <a:rPr lang="it-IT" smtClean="0"/>
-              <a:t>21/07/2022</a:t>
+              <a:t>30/08/2022</a:t>
             </a:fld>
             <a:endParaRPr lang="it-IT"/>
           </a:p>
@@ -2385,7 +2386,7 @@
           <a:p>
             <a:fld id="{F03EF477-0A65-48AB-937D-ED42217D2BDA}" type="datetimeFigureOut">
               <a:rPr lang="it-IT" smtClean="0"/>
-              <a:t>21/07/2022</a:t>
+              <a:t>30/08/2022</a:t>
             </a:fld>
             <a:endParaRPr lang="it-IT"/>
           </a:p>
@@ -2673,7 +2674,7 @@
           <a:p>
             <a:fld id="{F03EF477-0A65-48AB-937D-ED42217D2BDA}" type="datetimeFigureOut">
               <a:rPr lang="it-IT" smtClean="0"/>
-              <a:t>21/07/2022</a:t>
+              <a:t>30/08/2022</a:t>
             </a:fld>
             <a:endParaRPr lang="it-IT"/>
           </a:p>
@@ -2914,7 +2915,7 @@
           <a:p>
             <a:fld id="{F03EF477-0A65-48AB-937D-ED42217D2BDA}" type="datetimeFigureOut">
               <a:rPr lang="it-IT" smtClean="0"/>
-              <a:t>21/07/2022</a:t>
+              <a:t>30/08/2022</a:t>
             </a:fld>
             <a:endParaRPr lang="it-IT"/>
           </a:p>
@@ -4032,7 +4033,7 @@
           <p:nvPr>
             <p:extLst>
               <p:ext uri="{D42A27DB-BD31-4B8C-83A1-F6EECF244321}">
-                <p14:modId xmlns:p14="http://schemas.microsoft.com/office/powerpoint/2010/main" val="3817810802"/>
+                <p14:modId xmlns:p14="http://schemas.microsoft.com/office/powerpoint/2010/main" val="2971975968"/>
               </p:ext>
             </p:extLst>
           </p:nvPr>
@@ -4284,13 +4285,42 @@
                       </a:r>
                     </a:p>
                     <a:p>
-                      <a:pPr marL="285750" indent="-285750">
-                        <a:buFontTx/>
-                        <a:buChar char="-"/>
-                      </a:pPr>
-                      <a:r>
-                        <a:rPr lang="it-IT" sz="1400" dirty="0"/>
-                        <a:t>setPBar2(</a:t>
+                      <a:pPr marL="285750" marR="0" lvl="0" indent="-285750" algn="l" defTabSz="914400" rtl="0" eaLnBrk="1" fontAlgn="auto" latinLnBrk="0" hangingPunct="1">
+                        <a:lnSpc>
+                          <a:spcPct val="100000"/>
+                        </a:lnSpc>
+                        <a:spcBef>
+                          <a:spcPts val="0"/>
+                        </a:spcBef>
+                        <a:spcAft>
+                          <a:spcPts val="0"/>
+                        </a:spcAft>
+                        <a:buClrTx/>
+                        <a:buSzTx/>
+                        <a:buFontTx/>
+                        <a:buChar char="-"/>
+                        <a:tabLst/>
+                        <a:defRPr/>
+                      </a:pPr>
+                      <a:r>
+                        <a:rPr lang="it-IT" sz="1400" dirty="0"/>
+                        <a:t>starter(</a:t>
+                      </a:r>
+                      <a:r>
+                        <a:rPr lang="it-IT" sz="1400" dirty="0" err="1"/>
+                        <a:t>String</a:t>
+                      </a:r>
+                      <a:r>
+                        <a:rPr lang="it-IT" sz="1400" dirty="0"/>
+                        <a:t>, </a:t>
+                      </a:r>
+                      <a:r>
+                        <a:rPr lang="it-IT" sz="1400" dirty="0" err="1"/>
+                        <a:t>String</a:t>
+                      </a:r>
+                      <a:r>
+                        <a:rPr lang="it-IT" sz="1400" dirty="0"/>
+                        <a:t>, </a:t>
                       </a:r>
                       <a:r>
                         <a:rPr lang="it-IT" sz="1400" dirty="0" err="1"/>
@@ -4298,25 +4328,7 @@
                       </a:r>
                       <a:r>
                         <a:rPr lang="it-IT" sz="1400" dirty="0"/>
-                        <a:t>) </a:t>
-                      </a:r>
-                      <a:r>
-                        <a:rPr lang="it-IT" sz="1400" dirty="0" err="1"/>
-                        <a:t>return</a:t>
-                      </a:r>
-                      <a:r>
-                        <a:rPr lang="it-IT" sz="1400" dirty="0"/>
-                        <a:t>;</a:t>
-                      </a:r>
-                    </a:p>
-                    <a:p>
-                      <a:pPr marL="285750" indent="-285750">
-                        <a:buFontTx/>
-                        <a:buChar char="-"/>
-                      </a:pPr>
-                      <a:r>
-                        <a:rPr lang="it-IT" sz="1400" dirty="0"/>
-                        <a:t>setPBar1(</a:t>
+                        <a:t>, </a:t>
                       </a:r>
                       <a:r>
                         <a:rPr lang="it-IT" sz="1400" dirty="0" err="1"/>
@@ -4450,7 +4462,7 @@
           <p:nvPr>
             <p:extLst>
               <p:ext uri="{D42A27DB-BD31-4B8C-83A1-F6EECF244321}">
-                <p14:modId xmlns:p14="http://schemas.microsoft.com/office/powerpoint/2010/main" val="304913248"/>
+                <p14:modId xmlns:p14="http://schemas.microsoft.com/office/powerpoint/2010/main" val="1705379564"/>
               </p:ext>
             </p:extLst>
           </p:nvPr>
@@ -4719,7 +4731,23 @@
                       </a:pPr>
                       <a:r>
                         <a:rPr lang="it-IT" sz="1400" dirty="0"/>
-                        <a:t>setPBar2(</a:t>
+                        <a:t>starter(</a:t>
+                      </a:r>
+                      <a:r>
+                        <a:rPr lang="it-IT" sz="1400" dirty="0" err="1"/>
+                        <a:t>String</a:t>
+                      </a:r>
+                      <a:r>
+                        <a:rPr lang="it-IT" sz="1400" dirty="0"/>
+                        <a:t>, </a:t>
+                      </a:r>
+                      <a:r>
+                        <a:rPr lang="it-IT" sz="1400" dirty="0" err="1"/>
+                        <a:t>String</a:t>
+                      </a:r>
+                      <a:r>
+                        <a:rPr lang="it-IT" sz="1400" dirty="0"/>
+                        <a:t>, </a:t>
                       </a:r>
                       <a:r>
                         <a:rPr lang="it-IT" sz="1400" dirty="0" err="1"/>
@@ -4727,25 +4755,7 @@
                       </a:r>
                       <a:r>
                         <a:rPr lang="it-IT" sz="1400" dirty="0"/>
-                        <a:t>) </a:t>
-                      </a:r>
-                      <a:r>
-                        <a:rPr lang="it-IT" sz="1400" dirty="0" err="1"/>
-                        <a:t>return</a:t>
-                      </a:r>
-                      <a:r>
-                        <a:rPr lang="it-IT" sz="1400" dirty="0"/>
-                        <a:t>;</a:t>
-                      </a:r>
-                    </a:p>
-                    <a:p>
-                      <a:pPr marL="285750" indent="-285750">
-                        <a:buFontTx/>
-                        <a:buChar char="-"/>
-                      </a:pPr>
-                      <a:r>
-                        <a:rPr lang="it-IT" sz="1400" dirty="0"/>
-                        <a:t>setPBar1(</a:t>
+                        <a:t>, </a:t>
                       </a:r>
                       <a:r>
                         <a:rPr lang="it-IT" sz="1400" dirty="0" err="1"/>
@@ -5212,6 +5222,370 @@
                       <a:r>
                         <a:rPr lang="it-IT" sz="1400" dirty="0" err="1"/>
                         <a:t>String</a:t>
+                      </a:r>
+                      <a:r>
+                        <a:rPr lang="it-IT" sz="1400" dirty="0"/>
+                        <a:t>;</a:t>
+                      </a:r>
+                    </a:p>
+                  </a:txBody>
+                  <a:tcPr/>
+                </a:tc>
+                <a:extLst>
+                  <a:ext uri="{0D108BD9-81ED-4DB2-BD59-A6C34878D82A}">
+                    <a16:rowId xmlns:a16="http://schemas.microsoft.com/office/drawing/2014/main" val="2741319130"/>
+                  </a:ext>
+                </a:extLst>
+              </a:tr>
+            </a:tbl>
+          </a:graphicData>
+        </a:graphic>
+      </p:graphicFrame>
+      <p:graphicFrame>
+        <p:nvGraphicFramePr>
+          <p:cNvPr id="2" name="Tabella 6">
+            <a:extLst>
+              <a:ext uri="{FF2B5EF4-FFF2-40B4-BE49-F238E27FC236}">
+                <a16:creationId xmlns:a16="http://schemas.microsoft.com/office/drawing/2014/main" id="{3F9CDE22-8FA1-F060-17F4-5D25CFAE64A9}"/>
+              </a:ext>
+            </a:extLst>
+          </p:cNvPr>
+          <p:cNvGraphicFramePr>
+            <a:graphicFrameLocks noGrp="1"/>
+          </p:cNvGraphicFramePr>
+          <p:nvPr>
+            <p:extLst>
+              <p:ext uri="{D42A27DB-BD31-4B8C-83A1-F6EECF244321}">
+                <p14:modId xmlns:p14="http://schemas.microsoft.com/office/powerpoint/2010/main" val="2496454315"/>
+              </p:ext>
+            </p:extLst>
+          </p:nvPr>
+        </p:nvGraphicFramePr>
+        <p:xfrm>
+          <a:off x="5969000" y="3297394"/>
+          <a:ext cx="4662415" cy="3130025"/>
+        </p:xfrm>
+        <a:graphic>
+          <a:graphicData uri="http://schemas.openxmlformats.org/drawingml/2006/table">
+            <a:tbl>
+              <a:tblPr firstRow="1" bandRow="1">
+                <a:tableStyleId>{5C22544A-7EE6-4342-B048-85BDC9FD1C3A}</a:tableStyleId>
+              </a:tblPr>
+              <a:tblGrid>
+                <a:gridCol w="4662415">
+                  <a:extLst>
+                    <a:ext uri="{9D8B030D-6E8A-4147-A177-3AD203B41FA5}">
+                      <a16:colId xmlns:a16="http://schemas.microsoft.com/office/drawing/2014/main" val="3778643103"/>
+                    </a:ext>
+                  </a:extLst>
+                </a:gridCol>
+              </a:tblGrid>
+              <a:tr h="361697">
+                <a:tc>
+                  <a:txBody>
+                    <a:bodyPr/>
+                    <a:lstStyle/>
+                    <a:p>
+                      <a:pPr algn="ctr"/>
+                      <a:r>
+                        <a:rPr lang="it-IT" dirty="0" err="1"/>
+                        <a:t>EventDriver</a:t>
+                      </a:r>
+                      <a:endParaRPr lang="it-IT" dirty="0"/>
+                    </a:p>
+                  </a:txBody>
+                  <a:tcPr/>
+                </a:tc>
+                <a:extLst>
+                  <a:ext uri="{0D108BD9-81ED-4DB2-BD59-A6C34878D82A}">
+                    <a16:rowId xmlns:a16="http://schemas.microsoft.com/office/drawing/2014/main" val="3486388813"/>
+                  </a:ext>
+                </a:extLst>
+              </a:tr>
+              <a:tr h="965945">
+                <a:tc>
+                  <a:txBody>
+                    <a:bodyPr/>
+                    <a:lstStyle/>
+                    <a:p>
+                      <a:r>
+                        <a:rPr lang="it-IT" sz="1400" dirty="0"/>
+                        <a:t>Attributi:</a:t>
+                      </a:r>
+                    </a:p>
+                    <a:p>
+                      <a:r>
+                        <a:rPr lang="it-IT" sz="1400" dirty="0"/>
+                        <a:t>-      font: Font</a:t>
+                      </a:r>
+                    </a:p>
+                    <a:p>
+                      <a:pPr marL="285750" indent="-285750">
+                        <a:buFontTx/>
+                        <a:buChar char="-"/>
+                      </a:pPr>
+                      <a:r>
+                        <a:rPr lang="it-IT" sz="1400" dirty="0" err="1"/>
+                        <a:t>fileName</a:t>
+                      </a:r>
+                      <a:r>
+                        <a:rPr lang="it-IT" sz="1400" dirty="0"/>
+                        <a:t>: </a:t>
+                      </a:r>
+                      <a:r>
+                        <a:rPr lang="it-IT" sz="1400" dirty="0" err="1"/>
+                        <a:t>String</a:t>
+                      </a:r>
+                      <a:endParaRPr lang="it-IT" sz="1400" dirty="0"/>
+                    </a:p>
+                    <a:p>
+                      <a:pPr marL="285750" indent="-285750">
+                        <a:buFontTx/>
+                        <a:buChar char="-"/>
+                      </a:pPr>
+                      <a:r>
+                        <a:rPr lang="it-IT" sz="1400" dirty="0" err="1"/>
+                        <a:t>fc</a:t>
+                      </a:r>
+                      <a:r>
+                        <a:rPr lang="it-IT" sz="1400" dirty="0"/>
+                        <a:t>: </a:t>
+                      </a:r>
+                      <a:r>
+                        <a:rPr lang="it-IT" sz="1400" dirty="0" err="1"/>
+                        <a:t>JFileChooser</a:t>
+                      </a:r>
+                      <a:endParaRPr lang="it-IT" sz="1400" dirty="0"/>
+                    </a:p>
+                  </a:txBody>
+                  <a:tcPr/>
+                </a:tc>
+                <a:extLst>
+                  <a:ext uri="{0D108BD9-81ED-4DB2-BD59-A6C34878D82A}">
+                    <a16:rowId xmlns:a16="http://schemas.microsoft.com/office/drawing/2014/main" val="790189715"/>
+                  </a:ext>
+                </a:extLst>
+              </a:tr>
+              <a:tr h="1110800">
+                <a:tc>
+                  <a:txBody>
+                    <a:bodyPr/>
+                    <a:lstStyle/>
+                    <a:p>
+                      <a:r>
+                        <a:rPr lang="it-IT" sz="1400" dirty="0"/>
+                        <a:t>Metodi:</a:t>
+                      </a:r>
+                    </a:p>
+                    <a:p>
+                      <a:pPr marL="285750" indent="-285750">
+                        <a:buFontTx/>
+                        <a:buChar char="-"/>
+                      </a:pPr>
+                      <a:r>
+                        <a:rPr lang="en-US" sz="1400" dirty="0" err="1"/>
+                        <a:t>EventDriver</a:t>
+                      </a:r>
+                      <a:r>
+                        <a:rPr lang="en-US" sz="1400" dirty="0"/>
+                        <a:t>();</a:t>
+                      </a:r>
+                    </a:p>
+                    <a:p>
+                      <a:pPr marL="285750" indent="-285750">
+                        <a:buFontTx/>
+                        <a:buChar char="-"/>
+                      </a:pPr>
+                      <a:r>
+                        <a:rPr lang="it-IT" sz="1400" dirty="0" err="1"/>
+                        <a:t>newInstance</a:t>
+                      </a:r>
+                      <a:r>
+                        <a:rPr lang="it-IT" sz="1400" dirty="0"/>
+                        <a:t>() </a:t>
+                      </a:r>
+                      <a:r>
+                        <a:rPr lang="it-IT" sz="1400" dirty="0" err="1"/>
+                        <a:t>return</a:t>
+                      </a:r>
+                      <a:r>
+                        <a:rPr lang="it-IT" sz="1400" dirty="0"/>
+                        <a:t> </a:t>
+                      </a:r>
+                      <a:r>
+                        <a:rPr lang="it-IT" sz="1400" dirty="0" err="1"/>
+                        <a:t>EventDriver</a:t>
+                      </a:r>
+                      <a:r>
+                        <a:rPr lang="it-IT" sz="1400" dirty="0"/>
+                        <a:t>;</a:t>
+                      </a:r>
+                    </a:p>
+                    <a:p>
+                      <a:pPr marL="285750" indent="-285750">
+                        <a:buFontTx/>
+                        <a:buChar char="-"/>
+                      </a:pPr>
+                      <a:r>
+                        <a:rPr lang="it-IT" sz="1400" dirty="0" err="1"/>
+                        <a:t>setCryptoBar</a:t>
+                      </a:r>
+                      <a:r>
+                        <a:rPr lang="it-IT" sz="1400" dirty="0"/>
+                        <a:t>(</a:t>
+                      </a:r>
+                      <a:r>
+                        <a:rPr lang="it-IT" sz="1400" dirty="0" err="1"/>
+                        <a:t>JProgressBar</a:t>
+                      </a:r>
+                      <a:r>
+                        <a:rPr lang="it-IT" sz="1400" dirty="0"/>
+                        <a:t>) </a:t>
+                      </a:r>
+                      <a:r>
+                        <a:rPr lang="it-IT" sz="1400" dirty="0" err="1"/>
+                        <a:t>return</a:t>
+                      </a:r>
+                      <a:r>
+                        <a:rPr lang="it-IT" sz="1400" dirty="0"/>
+                        <a:t>;</a:t>
+                      </a:r>
+                    </a:p>
+                    <a:p>
+                      <a:pPr marL="285750" marR="0" lvl="0" indent="-285750" algn="l" defTabSz="914400" rtl="0" eaLnBrk="1" fontAlgn="auto" latinLnBrk="0" hangingPunct="1">
+                        <a:lnSpc>
+                          <a:spcPct val="100000"/>
+                        </a:lnSpc>
+                        <a:spcBef>
+                          <a:spcPts val="0"/>
+                        </a:spcBef>
+                        <a:spcAft>
+                          <a:spcPts val="0"/>
+                        </a:spcAft>
+                        <a:buClrTx/>
+                        <a:buSzTx/>
+                        <a:buFontTx/>
+                        <a:buChar char="-"/>
+                        <a:tabLst/>
+                        <a:defRPr/>
+                      </a:pPr>
+                      <a:r>
+                        <a:rPr lang="it-IT" sz="1400" dirty="0" err="1"/>
+                        <a:t>setZipBar</a:t>
+                      </a:r>
+                      <a:r>
+                        <a:rPr lang="it-IT" sz="1400" dirty="0"/>
+                        <a:t>(</a:t>
+                      </a:r>
+                      <a:r>
+                        <a:rPr lang="it-IT" sz="1400" dirty="0" err="1"/>
+                        <a:t>JProgressBar</a:t>
+                      </a:r>
+                      <a:r>
+                        <a:rPr lang="it-IT" sz="1400" dirty="0"/>
+                        <a:t>) </a:t>
+                      </a:r>
+                      <a:r>
+                        <a:rPr lang="it-IT" sz="1400" dirty="0" err="1"/>
+                        <a:t>return</a:t>
+                      </a:r>
+                      <a:r>
+                        <a:rPr lang="it-IT" sz="1400" dirty="0"/>
+                        <a:t>;</a:t>
+                      </a:r>
+                    </a:p>
+                    <a:p>
+                      <a:pPr marL="285750" indent="-285750">
+                        <a:buFontTx/>
+                        <a:buChar char="-"/>
+                      </a:pPr>
+                      <a:r>
+                        <a:rPr lang="it-IT" sz="1400" dirty="0" err="1"/>
+                        <a:t>initializer</a:t>
+                      </a:r>
+                      <a:r>
+                        <a:rPr lang="it-IT" sz="1400" dirty="0"/>
+                        <a:t>(</a:t>
+                      </a:r>
+                      <a:r>
+                        <a:rPr lang="it-IT" sz="1400" dirty="0" err="1"/>
+                        <a:t>String</a:t>
+                      </a:r>
+                      <a:r>
+                        <a:rPr lang="it-IT" sz="1400" dirty="0"/>
+                        <a:t>, </a:t>
+                      </a:r>
+                      <a:r>
+                        <a:rPr lang="it-IT" sz="1400" dirty="0" err="1"/>
+                        <a:t>String</a:t>
+                      </a:r>
+                      <a:r>
+                        <a:rPr lang="it-IT" sz="1400" dirty="0"/>
+                        <a:t>, </a:t>
+                      </a:r>
+                      <a:r>
+                        <a:rPr lang="it-IT" sz="1400" dirty="0" err="1"/>
+                        <a:t>String</a:t>
+                      </a:r>
+                      <a:r>
+                        <a:rPr lang="it-IT" sz="1400" dirty="0"/>
+                        <a:t>, </a:t>
+                      </a:r>
+                      <a:r>
+                        <a:rPr lang="it-IT" sz="1400" dirty="0" err="1"/>
+                        <a:t>boolean</a:t>
+                      </a:r>
+                      <a:r>
+                        <a:rPr lang="it-IT" sz="1400" dirty="0"/>
+                        <a:t>) </a:t>
+                      </a:r>
+                      <a:r>
+                        <a:rPr lang="it-IT" sz="1400" dirty="0" err="1"/>
+                        <a:t>return</a:t>
+                      </a:r>
+                      <a:r>
+                        <a:rPr lang="it-IT" sz="1400" dirty="0"/>
+                        <a:t>;</a:t>
+                      </a:r>
+                    </a:p>
+                    <a:p>
+                      <a:pPr marL="285750" indent="-285750">
+                        <a:buFontTx/>
+                        <a:buChar char="-"/>
+                      </a:pPr>
+                      <a:r>
+                        <a:rPr lang="it-IT" sz="1400" dirty="0" err="1"/>
+                        <a:t>encrEvent</a:t>
+                      </a:r>
+                      <a:r>
+                        <a:rPr lang="it-IT" sz="1400" dirty="0"/>
+                        <a:t>() </a:t>
+                      </a:r>
+                      <a:r>
+                        <a:rPr lang="it-IT" sz="1400" dirty="0" err="1"/>
+                        <a:t>return</a:t>
+                      </a:r>
+                      <a:r>
+                        <a:rPr lang="it-IT" sz="1400" dirty="0"/>
+                        <a:t>;</a:t>
+                      </a:r>
+                    </a:p>
+                    <a:p>
+                      <a:pPr marL="285750" indent="-285750">
+                        <a:buFontTx/>
+                        <a:buChar char="-"/>
+                      </a:pPr>
+                      <a:r>
+                        <a:rPr lang="it-IT" sz="1400" dirty="0" err="1"/>
+                        <a:t>decrEvent</a:t>
+                      </a:r>
+                      <a:r>
+                        <a:rPr lang="it-IT" sz="1400" dirty="0"/>
+                        <a:t>() </a:t>
+                      </a:r>
+                      <a:r>
+                        <a:rPr lang="it-IT" sz="1400" dirty="0" err="1"/>
+                        <a:t>return</a:t>
                       </a:r>
                       <a:r>
                         <a:rPr lang="it-IT" sz="1400" dirty="0"/>
@@ -5276,14 +5650,14 @@
           <p:nvPr>
             <p:extLst>
               <p:ext uri="{D42A27DB-BD31-4B8C-83A1-F6EECF244321}">
-                <p14:modId xmlns:p14="http://schemas.microsoft.com/office/powerpoint/2010/main" val="4171620805"/>
+                <p14:modId xmlns:p14="http://schemas.microsoft.com/office/powerpoint/2010/main" val="3387628701"/>
               </p:ext>
             </p:extLst>
           </p:nvPr>
         </p:nvGraphicFramePr>
         <p:xfrm>
           <a:off x="457199" y="244194"/>
-          <a:ext cx="4662415" cy="5275226"/>
+          <a:ext cx="4662415" cy="5061866"/>
         </p:xfrm>
         <a:graphic>
           <a:graphicData uri="http://schemas.openxmlformats.org/drawingml/2006/table">
@@ -5826,41 +6200,6 @@
                         <a:rPr lang="it-IT" sz="1400" dirty="0"/>
                         <a:t>);</a:t>
                       </a:r>
-                    </a:p>
-                    <a:p>
-                      <a:pPr marL="285750" indent="-285750">
-                        <a:buFontTx/>
-                        <a:buChar char="-"/>
-                      </a:pPr>
-                      <a:r>
-                        <a:rPr lang="it-IT" sz="1400" dirty="0" err="1"/>
-                        <a:t>LeftSideInitializer</a:t>
-                      </a:r>
-                      <a:r>
-                        <a:rPr lang="it-IT" sz="1400" dirty="0"/>
-                        <a:t>(</a:t>
-                      </a:r>
-                      <a:r>
-                        <a:rPr lang="it-IT" sz="1400" dirty="0" err="1"/>
-                        <a:t>JPanel</a:t>
-                      </a:r>
-                      <a:r>
-                        <a:rPr lang="it-IT" sz="1400" dirty="0"/>
-                        <a:t>) </a:t>
-                      </a:r>
-                      <a:r>
-                        <a:rPr lang="it-IT" sz="1400" dirty="0" err="1"/>
-                        <a:t>return</a:t>
-                      </a:r>
-                      <a:r>
-                        <a:rPr lang="it-IT" sz="1400" dirty="0"/>
-                        <a:t> </a:t>
-                      </a:r>
-                      <a:r>
-                        <a:rPr lang="it-IT" sz="1400" dirty="0" err="1"/>
-                        <a:t>LeftSide</a:t>
-                      </a:r>
-                      <a:endParaRPr lang="it-IT" sz="1400" dirty="0"/>
                     </a:p>
                   </a:txBody>
                   <a:tcPr/>
@@ -6062,14 +6401,14 @@
           <p:nvPr>
             <p:extLst>
               <p:ext uri="{D42A27DB-BD31-4B8C-83A1-F6EECF244321}">
-                <p14:modId xmlns:p14="http://schemas.microsoft.com/office/powerpoint/2010/main" val="2839946663"/>
+                <p14:modId xmlns:p14="http://schemas.microsoft.com/office/powerpoint/2010/main" val="3266721410"/>
               </p:ext>
             </p:extLst>
           </p:nvPr>
         </p:nvGraphicFramePr>
         <p:xfrm>
           <a:off x="6096000" y="2213301"/>
-          <a:ext cx="4662415" cy="2906984"/>
+          <a:ext cx="4662415" cy="2693624"/>
         </p:xfrm>
         <a:graphic>
           <a:graphicData uri="http://schemas.openxmlformats.org/drawingml/2006/table">
@@ -6313,44 +6652,6 @@
                       <a:r>
                         <a:rPr lang="it-IT" sz="1400" dirty="0"/>
                         <a:t>);</a:t>
-                      </a:r>
-                    </a:p>
-                    <a:p>
-                      <a:pPr marL="285750" indent="-285750">
-                        <a:buFontTx/>
-                        <a:buChar char="-"/>
-                      </a:pPr>
-                      <a:r>
-                        <a:rPr lang="it-IT" sz="1400" dirty="0" err="1"/>
-                        <a:t>RightSideInitializer</a:t>
-                      </a:r>
-                      <a:r>
-                        <a:rPr lang="it-IT" sz="1400" dirty="0"/>
-                        <a:t>(</a:t>
-                      </a:r>
-                      <a:r>
-                        <a:rPr lang="it-IT" sz="1400" dirty="0" err="1"/>
-                        <a:t>JPanel</a:t>
-                      </a:r>
-                      <a:r>
-                        <a:rPr lang="it-IT" sz="1400" dirty="0"/>
-                        <a:t>) </a:t>
-                      </a:r>
-                      <a:r>
-                        <a:rPr lang="it-IT" sz="1400" dirty="0" err="1"/>
-                        <a:t>return</a:t>
-                      </a:r>
-                      <a:r>
-                        <a:rPr lang="it-IT" sz="1400" dirty="0"/>
-                        <a:t> </a:t>
-                      </a:r>
-                      <a:r>
-                        <a:rPr lang="it-IT" sz="1400" dirty="0" err="1"/>
-                        <a:t>RightSide</a:t>
-                      </a:r>
-                      <a:r>
-                        <a:rPr lang="it-IT" sz="1400" dirty="0"/>
-                        <a:t>;</a:t>
                       </a:r>
                     </a:p>
                   </a:txBody>
@@ -7608,10 +7909,45 @@
       </p:grpSpPr>
       <p:sp>
         <p:nvSpPr>
-          <p:cNvPr id="2" name="Rettangolo con angoli arrotondati 1">
-            <a:extLst>
-              <a:ext uri="{FF2B5EF4-FFF2-40B4-BE49-F238E27FC236}">
-                <a16:creationId xmlns:a16="http://schemas.microsoft.com/office/drawing/2014/main" id="{7F5CAFB0-59C2-D34C-9E7F-29358E8BDC09}"/>
+          <p:cNvPr id="2" name="CasellaDiTesto 1">
+            <a:extLst>
+              <a:ext uri="{FF2B5EF4-FFF2-40B4-BE49-F238E27FC236}">
+                <a16:creationId xmlns:a16="http://schemas.microsoft.com/office/drawing/2014/main" id="{0D249075-5F99-00BF-11CE-7479E188BBBC}"/>
+              </a:ext>
+            </a:extLst>
+          </p:cNvPr>
+          <p:cNvSpPr txBox="1"/>
+          <p:nvPr/>
+        </p:nvSpPr>
+        <p:spPr>
+          <a:xfrm>
+            <a:off x="796954" y="511728"/>
+            <a:ext cx="3909270" cy="369332"/>
+          </a:xfrm>
+          <a:prstGeom prst="rect">
+            <a:avLst/>
+          </a:prstGeom>
+          <a:noFill/>
+        </p:spPr>
+        <p:txBody>
+          <a:bodyPr wrap="square" rtlCol="0">
+            <a:spAutoFit/>
+          </a:bodyPr>
+          <a:lstStyle/>
+          <a:p>
+            <a:r>
+              <a:rPr lang="it-IT" dirty="0"/>
+              <a:t>Legenda</a:t>
+            </a:r>
+          </a:p>
+        </p:txBody>
+      </p:sp>
+      <p:sp>
+        <p:nvSpPr>
+          <p:cNvPr id="3" name="Rettangolo con angoli arrotondati 2">
+            <a:extLst>
+              <a:ext uri="{FF2B5EF4-FFF2-40B4-BE49-F238E27FC236}">
+                <a16:creationId xmlns:a16="http://schemas.microsoft.com/office/drawing/2014/main" id="{105C1FD4-C368-2895-EE75-6A6829718C04}"/>
               </a:ext>
             </a:extLst>
           </p:cNvPr>
@@ -7620,7 +7956,436 @@
         </p:nvSpPr>
         <p:spPr>
           <a:xfrm>
-            <a:off x="2302429" y="348725"/>
+            <a:off x="847288" y="1585519"/>
+            <a:ext cx="2541864" cy="989901"/>
+          </a:xfrm>
+          <a:prstGeom prst="roundRect">
+            <a:avLst/>
+          </a:prstGeom>
+          <a:solidFill>
+            <a:schemeClr val="tx1"/>
+          </a:solidFill>
+        </p:spPr>
+        <p:style>
+          <a:lnRef idx="2">
+            <a:schemeClr val="accent1">
+              <a:shade val="50000"/>
+            </a:schemeClr>
+          </a:lnRef>
+          <a:fillRef idx="1">
+            <a:schemeClr val="accent1"/>
+          </a:fillRef>
+          <a:effectRef idx="0">
+            <a:schemeClr val="accent1"/>
+          </a:effectRef>
+          <a:fontRef idx="minor">
+            <a:schemeClr val="lt1"/>
+          </a:fontRef>
+        </p:style>
+        <p:txBody>
+          <a:bodyPr rtlCol="0" anchor="ctr"/>
+          <a:lstStyle/>
+          <a:p>
+            <a:pPr algn="ctr"/>
+            <a:r>
+              <a:rPr lang="it-IT" dirty="0"/>
+              <a:t>Classe utilizzatrice</a:t>
+            </a:r>
+          </a:p>
+        </p:txBody>
+      </p:sp>
+      <p:sp>
+        <p:nvSpPr>
+          <p:cNvPr id="4" name="Rettangolo con angoli arrotondati 3">
+            <a:extLst>
+              <a:ext uri="{FF2B5EF4-FFF2-40B4-BE49-F238E27FC236}">
+                <a16:creationId xmlns:a16="http://schemas.microsoft.com/office/drawing/2014/main" id="{BB1C1CB8-9096-4E2D-7EB9-3017F436F7C4}"/>
+              </a:ext>
+            </a:extLst>
+          </p:cNvPr>
+          <p:cNvSpPr/>
+          <p:nvPr/>
+        </p:nvSpPr>
+        <p:spPr>
+          <a:xfrm>
+            <a:off x="6606330" y="3584678"/>
+            <a:ext cx="2541864" cy="989901"/>
+          </a:xfrm>
+          <a:prstGeom prst="roundRect">
+            <a:avLst/>
+          </a:prstGeom>
+          <a:solidFill>
+            <a:schemeClr val="tx1"/>
+          </a:solidFill>
+        </p:spPr>
+        <p:style>
+          <a:lnRef idx="2">
+            <a:schemeClr val="accent1">
+              <a:shade val="50000"/>
+            </a:schemeClr>
+          </a:lnRef>
+          <a:fillRef idx="1">
+            <a:schemeClr val="accent1"/>
+          </a:fillRef>
+          <a:effectRef idx="0">
+            <a:schemeClr val="accent1"/>
+          </a:effectRef>
+          <a:fontRef idx="minor">
+            <a:schemeClr val="lt1"/>
+          </a:fontRef>
+        </p:style>
+        <p:txBody>
+          <a:bodyPr rtlCol="0" anchor="ctr"/>
+          <a:lstStyle/>
+          <a:p>
+            <a:pPr algn="ctr"/>
+            <a:r>
+              <a:rPr lang="it-IT"/>
+              <a:t>Classe utilizzatrice/classe utilizzata</a:t>
+            </a:r>
+            <a:endParaRPr lang="it-IT" dirty="0"/>
+          </a:p>
+        </p:txBody>
+      </p:sp>
+      <p:sp>
+        <p:nvSpPr>
+          <p:cNvPr id="5" name="Rettangolo con angoli arrotondati 4">
+            <a:extLst>
+              <a:ext uri="{FF2B5EF4-FFF2-40B4-BE49-F238E27FC236}">
+                <a16:creationId xmlns:a16="http://schemas.microsoft.com/office/drawing/2014/main" id="{DDC350FD-223C-1F7C-6619-08A23EED2407}"/>
+              </a:ext>
+            </a:extLst>
+          </p:cNvPr>
+          <p:cNvSpPr/>
+          <p:nvPr/>
+        </p:nvSpPr>
+        <p:spPr>
+          <a:xfrm>
+            <a:off x="847288" y="3584678"/>
+            <a:ext cx="2541864" cy="989901"/>
+          </a:xfrm>
+          <a:prstGeom prst="roundRect">
+            <a:avLst/>
+          </a:prstGeom>
+          <a:solidFill>
+            <a:schemeClr val="tx1"/>
+          </a:solidFill>
+        </p:spPr>
+        <p:style>
+          <a:lnRef idx="2">
+            <a:schemeClr val="accent1">
+              <a:shade val="50000"/>
+            </a:schemeClr>
+          </a:lnRef>
+          <a:fillRef idx="1">
+            <a:schemeClr val="accent1"/>
+          </a:fillRef>
+          <a:effectRef idx="0">
+            <a:schemeClr val="accent1"/>
+          </a:effectRef>
+          <a:fontRef idx="minor">
+            <a:schemeClr val="lt1"/>
+          </a:fontRef>
+        </p:style>
+        <p:txBody>
+          <a:bodyPr rtlCol="0" anchor="ctr"/>
+          <a:lstStyle/>
+          <a:p>
+            <a:pPr algn="ctr"/>
+            <a:r>
+              <a:rPr lang="it-IT" dirty="0"/>
+              <a:t>Classe utilizzatrice/classe utilizzata</a:t>
+            </a:r>
+          </a:p>
+        </p:txBody>
+      </p:sp>
+      <p:sp>
+        <p:nvSpPr>
+          <p:cNvPr id="6" name="Rettangolo con angoli arrotondati 5">
+            <a:extLst>
+              <a:ext uri="{FF2B5EF4-FFF2-40B4-BE49-F238E27FC236}">
+                <a16:creationId xmlns:a16="http://schemas.microsoft.com/office/drawing/2014/main" id="{22D5068C-B283-DDD6-B863-6A5B5A0367CC}"/>
+              </a:ext>
+            </a:extLst>
+          </p:cNvPr>
+          <p:cNvSpPr/>
+          <p:nvPr/>
+        </p:nvSpPr>
+        <p:spPr>
+          <a:xfrm>
+            <a:off x="6606330" y="1585519"/>
+            <a:ext cx="2541864" cy="989901"/>
+          </a:xfrm>
+          <a:prstGeom prst="roundRect">
+            <a:avLst/>
+          </a:prstGeom>
+          <a:solidFill>
+            <a:schemeClr val="tx1"/>
+          </a:solidFill>
+        </p:spPr>
+        <p:style>
+          <a:lnRef idx="2">
+            <a:schemeClr val="accent1">
+              <a:shade val="50000"/>
+            </a:schemeClr>
+          </a:lnRef>
+          <a:fillRef idx="1">
+            <a:schemeClr val="accent1"/>
+          </a:fillRef>
+          <a:effectRef idx="0">
+            <a:schemeClr val="accent1"/>
+          </a:effectRef>
+          <a:fontRef idx="minor">
+            <a:schemeClr val="lt1"/>
+          </a:fontRef>
+        </p:style>
+        <p:txBody>
+          <a:bodyPr rtlCol="0" anchor="ctr"/>
+          <a:lstStyle/>
+          <a:p>
+            <a:pPr algn="ctr"/>
+            <a:r>
+              <a:rPr lang="it-IT" dirty="0"/>
+              <a:t>Classe utilizzata</a:t>
+            </a:r>
+          </a:p>
+        </p:txBody>
+      </p:sp>
+      <p:cxnSp>
+        <p:nvCxnSpPr>
+          <p:cNvPr id="8" name="Connettore 2 7">
+            <a:extLst>
+              <a:ext uri="{FF2B5EF4-FFF2-40B4-BE49-F238E27FC236}">
+                <a16:creationId xmlns:a16="http://schemas.microsoft.com/office/drawing/2014/main" id="{88E44BB5-E5C6-A66B-75A4-1B8D2C4A93DF}"/>
+              </a:ext>
+            </a:extLst>
+          </p:cNvPr>
+          <p:cNvCxnSpPr>
+            <a:stCxn id="3" idx="3"/>
+            <a:endCxn id="6" idx="1"/>
+          </p:cNvCxnSpPr>
+          <p:nvPr/>
+        </p:nvCxnSpPr>
+        <p:spPr>
+          <a:xfrm>
+            <a:off x="3389152" y="2080470"/>
+            <a:ext cx="3217178" cy="0"/>
+          </a:xfrm>
+          <a:prstGeom prst="straightConnector1">
+            <a:avLst/>
+          </a:prstGeom>
+          <a:ln>
+            <a:tailEnd type="triangle"/>
+          </a:ln>
+        </p:spPr>
+        <p:style>
+          <a:lnRef idx="1">
+            <a:schemeClr val="accent1"/>
+          </a:lnRef>
+          <a:fillRef idx="0">
+            <a:schemeClr val="accent1"/>
+          </a:fillRef>
+          <a:effectRef idx="0">
+            <a:schemeClr val="accent1"/>
+          </a:effectRef>
+          <a:fontRef idx="minor">
+            <a:schemeClr val="tx1"/>
+          </a:fontRef>
+        </p:style>
+      </p:cxnSp>
+      <p:cxnSp>
+        <p:nvCxnSpPr>
+          <p:cNvPr id="10" name="Connettore 2 9">
+            <a:extLst>
+              <a:ext uri="{FF2B5EF4-FFF2-40B4-BE49-F238E27FC236}">
+                <a16:creationId xmlns:a16="http://schemas.microsoft.com/office/drawing/2014/main" id="{E04D5876-30C1-3163-5E82-27824EE10625}"/>
+              </a:ext>
+            </a:extLst>
+          </p:cNvPr>
+          <p:cNvCxnSpPr>
+            <a:stCxn id="5" idx="3"/>
+            <a:endCxn id="4" idx="1"/>
+          </p:cNvCxnSpPr>
+          <p:nvPr/>
+        </p:nvCxnSpPr>
+        <p:spPr>
+          <a:xfrm>
+            <a:off x="3389152" y="4079629"/>
+            <a:ext cx="3217178" cy="0"/>
+          </a:xfrm>
+          <a:prstGeom prst="straightConnector1">
+            <a:avLst/>
+          </a:prstGeom>
+          <a:ln>
+            <a:headEnd type="triangle"/>
+            <a:tailEnd type="triangle"/>
+          </a:ln>
+        </p:spPr>
+        <p:style>
+          <a:lnRef idx="1">
+            <a:schemeClr val="accent1"/>
+          </a:lnRef>
+          <a:fillRef idx="0">
+            <a:schemeClr val="accent1"/>
+          </a:fillRef>
+          <a:effectRef idx="0">
+            <a:schemeClr val="accent1"/>
+          </a:effectRef>
+          <a:fontRef idx="minor">
+            <a:schemeClr val="tx1"/>
+          </a:fontRef>
+        </p:style>
+      </p:cxnSp>
+      <p:sp>
+        <p:nvSpPr>
+          <p:cNvPr id="11" name="CasellaDiTesto 10">
+            <a:extLst>
+              <a:ext uri="{FF2B5EF4-FFF2-40B4-BE49-F238E27FC236}">
+                <a16:creationId xmlns:a16="http://schemas.microsoft.com/office/drawing/2014/main" id="{99D5F1CF-45F2-8616-BD88-3BAF3ACBB9B5}"/>
+              </a:ext>
+            </a:extLst>
+          </p:cNvPr>
+          <p:cNvSpPr txBox="1"/>
+          <p:nvPr/>
+        </p:nvSpPr>
+        <p:spPr>
+          <a:xfrm>
+            <a:off x="847288" y="1090569"/>
+            <a:ext cx="2768367" cy="369332"/>
+          </a:xfrm>
+          <a:prstGeom prst="rect">
+            <a:avLst/>
+          </a:prstGeom>
+          <a:noFill/>
+        </p:spPr>
+        <p:txBody>
+          <a:bodyPr wrap="square" rtlCol="0">
+            <a:spAutoFit/>
+          </a:bodyPr>
+          <a:lstStyle/>
+          <a:p>
+            <a:r>
+              <a:rPr lang="it-IT" dirty="0"/>
+              <a:t>1° caso:</a:t>
+            </a:r>
+          </a:p>
+        </p:txBody>
+      </p:sp>
+      <p:sp>
+        <p:nvSpPr>
+          <p:cNvPr id="12" name="CasellaDiTesto 11">
+            <a:extLst>
+              <a:ext uri="{FF2B5EF4-FFF2-40B4-BE49-F238E27FC236}">
+                <a16:creationId xmlns:a16="http://schemas.microsoft.com/office/drawing/2014/main" id="{E78B0858-6E19-E41D-2B16-95AC2BA7609B}"/>
+              </a:ext>
+            </a:extLst>
+          </p:cNvPr>
+          <p:cNvSpPr txBox="1"/>
+          <p:nvPr/>
+        </p:nvSpPr>
+        <p:spPr>
+          <a:xfrm>
+            <a:off x="847288" y="3088656"/>
+            <a:ext cx="2768367" cy="369332"/>
+          </a:xfrm>
+          <a:prstGeom prst="rect">
+            <a:avLst/>
+          </a:prstGeom>
+          <a:noFill/>
+        </p:spPr>
+        <p:txBody>
+          <a:bodyPr wrap="square" rtlCol="0">
+            <a:spAutoFit/>
+          </a:bodyPr>
+          <a:lstStyle/>
+          <a:p>
+            <a:r>
+              <a:rPr lang="it-IT" dirty="0"/>
+              <a:t>2° caso:</a:t>
+            </a:r>
+          </a:p>
+        </p:txBody>
+      </p:sp>
+      <p:sp>
+        <p:nvSpPr>
+          <p:cNvPr id="13" name="CasellaDiTesto 12">
+            <a:extLst>
+              <a:ext uri="{FF2B5EF4-FFF2-40B4-BE49-F238E27FC236}">
+                <a16:creationId xmlns:a16="http://schemas.microsoft.com/office/drawing/2014/main" id="{C4F4A9D9-3BDF-057B-22F9-D82B22E2692C}"/>
+              </a:ext>
+            </a:extLst>
+          </p:cNvPr>
+          <p:cNvSpPr txBox="1"/>
+          <p:nvPr/>
+        </p:nvSpPr>
+        <p:spPr>
+          <a:xfrm>
+            <a:off x="847288" y="5178587"/>
+            <a:ext cx="8300906" cy="369332"/>
+          </a:xfrm>
+          <a:prstGeom prst="rect">
+            <a:avLst/>
+          </a:prstGeom>
+          <a:noFill/>
+        </p:spPr>
+        <p:txBody>
+          <a:bodyPr wrap="square" rtlCol="0">
+            <a:spAutoFit/>
+          </a:bodyPr>
+          <a:lstStyle/>
+          <a:p>
+            <a:r>
+              <a:rPr lang="it-IT" dirty="0"/>
+              <a:t>*Le classi si scambiano il ruolo di utilizzatrice/utilizzata in punti diversi dell’esecuzione </a:t>
+            </a:r>
+          </a:p>
+        </p:txBody>
+      </p:sp>
+    </p:spTree>
+    <p:extLst>
+      <p:ext uri="{BB962C8B-B14F-4D97-AF65-F5344CB8AC3E}">
+        <p14:creationId xmlns:p14="http://schemas.microsoft.com/office/powerpoint/2010/main" val="2839811784"/>
+      </p:ext>
+    </p:extLst>
+  </p:cSld>
+  <p:clrMapOvr>
+    <a:masterClrMapping/>
+  </p:clrMapOvr>
+</p:sld>
+</file>
+
+<file path=ppt/slides/slide7.xml><?xml version="1.0" encoding="utf-8"?>
+<p:sld xmlns:a="http://schemas.openxmlformats.org/drawingml/2006/main" xmlns:r="http://schemas.openxmlformats.org/officeDocument/2006/relationships" xmlns:p="http://schemas.openxmlformats.org/presentationml/2006/main">
+  <p:cSld>
+    <p:spTree>
+      <p:nvGrpSpPr>
+        <p:cNvPr id="1" name=""/>
+        <p:cNvGrpSpPr/>
+        <p:nvPr/>
+      </p:nvGrpSpPr>
+      <p:grpSpPr>
+        <a:xfrm>
+          <a:off x="0" y="0"/>
+          <a:ext cx="0" cy="0"/>
+          <a:chOff x="0" y="0"/>
+          <a:chExt cx="0" cy="0"/>
+        </a:xfrm>
+      </p:grpSpPr>
+      <p:sp>
+        <p:nvSpPr>
+          <p:cNvPr id="2" name="Rettangolo con angoli arrotondati 1">
+            <a:extLst>
+              <a:ext uri="{FF2B5EF4-FFF2-40B4-BE49-F238E27FC236}">
+                <a16:creationId xmlns:a16="http://schemas.microsoft.com/office/drawing/2014/main" id="{7F5CAFB0-59C2-D34C-9E7F-29358E8BDC09}"/>
+              </a:ext>
+            </a:extLst>
+          </p:cNvPr>
+          <p:cNvSpPr/>
+          <p:nvPr/>
+        </p:nvSpPr>
+        <p:spPr>
+          <a:xfrm>
+            <a:off x="162070" y="3079750"/>
             <a:ext cx="1879600" cy="698500"/>
           </a:xfrm>
           <a:prstGeom prst="roundRect">
@@ -7669,7 +8434,7 @@
         </p:nvSpPr>
         <p:spPr>
           <a:xfrm>
-            <a:off x="828762" y="1576839"/>
+            <a:off x="1595191" y="4469236"/>
             <a:ext cx="1879600" cy="698500"/>
           </a:xfrm>
           <a:prstGeom prst="roundRect">
@@ -7719,7 +8484,7 @@
         </p:nvSpPr>
         <p:spPr>
           <a:xfrm>
-            <a:off x="3714575" y="1576839"/>
+            <a:off x="1595191" y="1690264"/>
             <a:ext cx="1879600" cy="698500"/>
           </a:xfrm>
           <a:prstGeom prst="roundRect">
@@ -7769,7 +8534,7 @@
         </p:nvSpPr>
         <p:spPr>
           <a:xfrm>
-            <a:off x="1294003" y="3142553"/>
+            <a:off x="502175" y="5858722"/>
             <a:ext cx="1879600" cy="698500"/>
           </a:xfrm>
           <a:prstGeom prst="roundRect">
@@ -7819,7 +8584,7 @@
         </p:nvSpPr>
         <p:spPr>
           <a:xfrm>
-            <a:off x="5216205" y="4425195"/>
+            <a:off x="4746305" y="4465479"/>
             <a:ext cx="1879600" cy="698500"/>
           </a:xfrm>
           <a:prstGeom prst="roundRect">
@@ -7869,7 +8634,7 @@
         </p:nvSpPr>
         <p:spPr>
           <a:xfrm>
-            <a:off x="9777019" y="4119986"/>
+            <a:off x="9777019" y="5119790"/>
             <a:ext cx="1879600" cy="698500"/>
           </a:xfrm>
           <a:prstGeom prst="roundRect">
@@ -7969,7 +8734,7 @@
         </p:nvSpPr>
         <p:spPr>
           <a:xfrm>
-            <a:off x="7194142" y="2841653"/>
+            <a:off x="7194142" y="3178203"/>
             <a:ext cx="1879600" cy="698500"/>
           </a:xfrm>
           <a:prstGeom prst="roundRect">
@@ -8019,7 +8784,7 @@
         </p:nvSpPr>
         <p:spPr>
           <a:xfrm>
-            <a:off x="9777019" y="2841653"/>
+            <a:off x="9777019" y="3178203"/>
             <a:ext cx="1879600" cy="698500"/>
           </a:xfrm>
           <a:prstGeom prst="roundRect">
@@ -8119,7 +8884,7 @@
         </p:nvSpPr>
         <p:spPr>
           <a:xfrm>
-            <a:off x="3714575" y="3142553"/>
+            <a:off x="4156978" y="166945"/>
             <a:ext cx="1879600" cy="698500"/>
           </a:xfrm>
           <a:prstGeom prst="roundRect">
@@ -8169,7 +8934,7 @@
         </p:nvSpPr>
         <p:spPr>
           <a:xfrm>
-            <a:off x="125485" y="4425195"/>
+            <a:off x="5932181" y="5858722"/>
             <a:ext cx="1879600" cy="698500"/>
           </a:xfrm>
           <a:prstGeom prst="roundRect">
@@ -8205,24 +8970,451 @@
           </a:p>
         </p:txBody>
       </p:sp>
+      <p:sp>
+        <p:nvSpPr>
+          <p:cNvPr id="18" name="Rettangolo con angoli arrotondati 17">
+            <a:extLst>
+              <a:ext uri="{FF2B5EF4-FFF2-40B4-BE49-F238E27FC236}">
+                <a16:creationId xmlns:a16="http://schemas.microsoft.com/office/drawing/2014/main" id="{35967FD1-2174-352B-FDD1-866759FC849A}"/>
+              </a:ext>
+            </a:extLst>
+          </p:cNvPr>
+          <p:cNvSpPr/>
+          <p:nvPr/>
+        </p:nvSpPr>
+        <p:spPr>
+          <a:xfrm>
+            <a:off x="3217178" y="5858722"/>
+            <a:ext cx="1879600" cy="698500"/>
+          </a:xfrm>
+          <a:prstGeom prst="roundRect">
+            <a:avLst/>
+          </a:prstGeom>
+        </p:spPr>
+        <p:style>
+          <a:lnRef idx="2">
+            <a:schemeClr val="dk1">
+              <a:shade val="50000"/>
+            </a:schemeClr>
+          </a:lnRef>
+          <a:fillRef idx="1">
+            <a:schemeClr val="dk1"/>
+          </a:fillRef>
+          <a:effectRef idx="0">
+            <a:schemeClr val="dk1"/>
+          </a:effectRef>
+          <a:fontRef idx="minor">
+            <a:schemeClr val="lt1"/>
+          </a:fontRef>
+        </p:style>
+        <p:txBody>
+          <a:bodyPr rtlCol="0" anchor="ctr"/>
+          <a:lstStyle/>
+          <a:p>
+            <a:pPr algn="ctr"/>
+            <a:r>
+              <a:rPr lang="it-IT" dirty="0" err="1"/>
+              <a:t>EventDriver</a:t>
+            </a:r>
+            <a:endParaRPr lang="it-IT" dirty="0"/>
+          </a:p>
+        </p:txBody>
+      </p:sp>
       <p:cxnSp>
         <p:nvCxnSpPr>
-          <p:cNvPr id="15" name="Connettore 2 14">
-            <a:extLst>
-              <a:ext uri="{FF2B5EF4-FFF2-40B4-BE49-F238E27FC236}">
-                <a16:creationId xmlns:a16="http://schemas.microsoft.com/office/drawing/2014/main" id="{976B1567-79EE-D53D-DBDE-4CD4DE3FADDC}"/>
+          <p:cNvPr id="21" name="Connettore 2 20">
+            <a:extLst>
+              <a:ext uri="{FF2B5EF4-FFF2-40B4-BE49-F238E27FC236}">
+                <a16:creationId xmlns:a16="http://schemas.microsoft.com/office/drawing/2014/main" id="{0EED9721-8566-C418-B02D-5743D3027BEA}"/>
               </a:ext>
             </a:extLst>
           </p:cNvPr>
           <p:cNvCxnSpPr>
+            <a:stCxn id="2" idx="0"/>
+            <a:endCxn id="4" idx="2"/>
+          </p:cNvCxnSpPr>
+          <p:nvPr/>
+        </p:nvCxnSpPr>
+        <p:spPr>
+          <a:xfrm flipV="1">
+            <a:off x="1101870" y="2388764"/>
+            <a:ext cx="1433121" cy="690986"/>
+          </a:xfrm>
+          <a:prstGeom prst="straightConnector1">
+            <a:avLst/>
+          </a:prstGeom>
+          <a:ln>
+            <a:tailEnd type="triangle"/>
+          </a:ln>
+        </p:spPr>
+        <p:style>
+          <a:lnRef idx="1">
+            <a:schemeClr val="accent1"/>
+          </a:lnRef>
+          <a:fillRef idx="0">
+            <a:schemeClr val="accent1"/>
+          </a:fillRef>
+          <a:effectRef idx="0">
+            <a:schemeClr val="accent1"/>
+          </a:effectRef>
+          <a:fontRef idx="minor">
+            <a:schemeClr val="tx1"/>
+          </a:fontRef>
+        </p:style>
+      </p:cxnSp>
+      <p:cxnSp>
+        <p:nvCxnSpPr>
+          <p:cNvPr id="25" name="Connettore 2 24">
+            <a:extLst>
+              <a:ext uri="{FF2B5EF4-FFF2-40B4-BE49-F238E27FC236}">
+                <a16:creationId xmlns:a16="http://schemas.microsoft.com/office/drawing/2014/main" id="{B98D8FA2-1427-8BDF-083B-38F7406A4C48}"/>
+              </a:ext>
+            </a:extLst>
+          </p:cNvPr>
+          <p:cNvCxnSpPr>
+            <a:stCxn id="2" idx="2"/>
             <a:endCxn id="3" idx="0"/>
           </p:cNvCxnSpPr>
           <p:nvPr/>
         </p:nvCxnSpPr>
         <p:spPr>
+          <a:xfrm>
+            <a:off x="1101870" y="3778250"/>
+            <a:ext cx="1433121" cy="690986"/>
+          </a:xfrm>
+          <a:prstGeom prst="straightConnector1">
+            <a:avLst/>
+          </a:prstGeom>
+          <a:ln>
+            <a:tailEnd type="triangle"/>
+          </a:ln>
+        </p:spPr>
+        <p:style>
+          <a:lnRef idx="1">
+            <a:schemeClr val="accent1"/>
+          </a:lnRef>
+          <a:fillRef idx="0">
+            <a:schemeClr val="accent1"/>
+          </a:fillRef>
+          <a:effectRef idx="0">
+            <a:schemeClr val="accent1"/>
+          </a:effectRef>
+          <a:fontRef idx="minor">
+            <a:schemeClr val="tx1"/>
+          </a:fontRef>
+        </p:style>
+      </p:cxnSp>
+      <p:cxnSp>
+        <p:nvCxnSpPr>
+          <p:cNvPr id="28" name="Connettore 2 27">
+            <a:extLst>
+              <a:ext uri="{FF2B5EF4-FFF2-40B4-BE49-F238E27FC236}">
+                <a16:creationId xmlns:a16="http://schemas.microsoft.com/office/drawing/2014/main" id="{F7FA3B91-60FE-6B47-AB0B-45307A1B8EBB}"/>
+              </a:ext>
+            </a:extLst>
+          </p:cNvPr>
+          <p:cNvCxnSpPr>
+            <a:stCxn id="4" idx="0"/>
+            <a:endCxn id="12" idx="2"/>
+          </p:cNvCxnSpPr>
+          <p:nvPr/>
+        </p:nvCxnSpPr>
+        <p:spPr>
+          <a:xfrm flipV="1">
+            <a:off x="2534991" y="865445"/>
+            <a:ext cx="2561787" cy="824819"/>
+          </a:xfrm>
+          <a:prstGeom prst="straightConnector1">
+            <a:avLst/>
+          </a:prstGeom>
+          <a:ln>
+            <a:tailEnd type="triangle"/>
+          </a:ln>
+        </p:spPr>
+        <p:style>
+          <a:lnRef idx="1">
+            <a:schemeClr val="accent1"/>
+          </a:lnRef>
+          <a:fillRef idx="0">
+            <a:schemeClr val="accent1"/>
+          </a:fillRef>
+          <a:effectRef idx="0">
+            <a:schemeClr val="accent1"/>
+          </a:effectRef>
+          <a:fontRef idx="minor">
+            <a:schemeClr val="tx1"/>
+          </a:fontRef>
+        </p:style>
+      </p:cxnSp>
+      <p:cxnSp>
+        <p:nvCxnSpPr>
+          <p:cNvPr id="32" name="Connettore 2 31">
+            <a:extLst>
+              <a:ext uri="{FF2B5EF4-FFF2-40B4-BE49-F238E27FC236}">
+                <a16:creationId xmlns:a16="http://schemas.microsoft.com/office/drawing/2014/main" id="{4B3E75EE-D4E2-B799-DD8F-A7188974AEC4}"/>
+              </a:ext>
+            </a:extLst>
+          </p:cNvPr>
+          <p:cNvCxnSpPr>
+            <a:stCxn id="3" idx="2"/>
+            <a:endCxn id="5" idx="0"/>
+          </p:cNvCxnSpPr>
+          <p:nvPr/>
+        </p:nvCxnSpPr>
+        <p:spPr>
           <a:xfrm flipH="1">
-            <a:off x="1768562" y="1047225"/>
-            <a:ext cx="1175974" cy="529614"/>
+            <a:off x="1441975" y="5167736"/>
+            <a:ext cx="1093016" cy="690986"/>
+          </a:xfrm>
+          <a:prstGeom prst="straightConnector1">
+            <a:avLst/>
+          </a:prstGeom>
+          <a:ln>
+            <a:tailEnd type="triangle"/>
+          </a:ln>
+        </p:spPr>
+        <p:style>
+          <a:lnRef idx="1">
+            <a:schemeClr val="accent1"/>
+          </a:lnRef>
+          <a:fillRef idx="0">
+            <a:schemeClr val="accent1"/>
+          </a:fillRef>
+          <a:effectRef idx="0">
+            <a:schemeClr val="accent1"/>
+          </a:effectRef>
+          <a:fontRef idx="minor">
+            <a:schemeClr val="tx1"/>
+          </a:fontRef>
+        </p:style>
+      </p:cxnSp>
+      <p:cxnSp>
+        <p:nvCxnSpPr>
+          <p:cNvPr id="34" name="Connettore 2 33">
+            <a:extLst>
+              <a:ext uri="{FF2B5EF4-FFF2-40B4-BE49-F238E27FC236}">
+                <a16:creationId xmlns:a16="http://schemas.microsoft.com/office/drawing/2014/main" id="{6698A391-AC71-1E40-88D7-BB40488E65F6}"/>
+              </a:ext>
+            </a:extLst>
+          </p:cNvPr>
+          <p:cNvCxnSpPr>
+            <a:stCxn id="3" idx="2"/>
+            <a:endCxn id="18" idx="0"/>
+          </p:cNvCxnSpPr>
+          <p:nvPr/>
+        </p:nvCxnSpPr>
+        <p:spPr>
+          <a:xfrm>
+            <a:off x="2534991" y="5167736"/>
+            <a:ext cx="1621987" cy="690986"/>
+          </a:xfrm>
+          <a:prstGeom prst="straightConnector1">
+            <a:avLst/>
+          </a:prstGeom>
+          <a:ln>
+            <a:tailEnd type="triangle"/>
+          </a:ln>
+        </p:spPr>
+        <p:style>
+          <a:lnRef idx="1">
+            <a:schemeClr val="accent1"/>
+          </a:lnRef>
+          <a:fillRef idx="0">
+            <a:schemeClr val="accent1"/>
+          </a:fillRef>
+          <a:effectRef idx="0">
+            <a:schemeClr val="accent1"/>
+          </a:effectRef>
+          <a:fontRef idx="minor">
+            <a:schemeClr val="tx1"/>
+          </a:fontRef>
+        </p:style>
+      </p:cxnSp>
+      <p:cxnSp>
+        <p:nvCxnSpPr>
+          <p:cNvPr id="38" name="Connettore 2 37">
+            <a:extLst>
+              <a:ext uri="{FF2B5EF4-FFF2-40B4-BE49-F238E27FC236}">
+                <a16:creationId xmlns:a16="http://schemas.microsoft.com/office/drawing/2014/main" id="{6BFF3D04-C730-0AC2-6733-1A7C66567FDD}"/>
+              </a:ext>
+            </a:extLst>
+          </p:cNvPr>
+          <p:cNvCxnSpPr>
+            <a:cxnSpLocks/>
+          </p:cNvCxnSpPr>
+          <p:nvPr/>
+        </p:nvCxnSpPr>
+        <p:spPr>
+          <a:xfrm>
+            <a:off x="3028312" y="2388764"/>
+            <a:ext cx="1539495" cy="3469958"/>
+          </a:xfrm>
+          <a:prstGeom prst="straightConnector1">
+            <a:avLst/>
+          </a:prstGeom>
+          <a:ln>
+            <a:tailEnd type="triangle"/>
+          </a:ln>
+        </p:spPr>
+        <p:style>
+          <a:lnRef idx="1">
+            <a:schemeClr val="accent1"/>
+          </a:lnRef>
+          <a:fillRef idx="0">
+            <a:schemeClr val="accent1"/>
+          </a:fillRef>
+          <a:effectRef idx="0">
+            <a:schemeClr val="accent1"/>
+          </a:effectRef>
+          <a:fontRef idx="minor">
+            <a:schemeClr val="tx1"/>
+          </a:fontRef>
+        </p:style>
+      </p:cxnSp>
+      <p:cxnSp>
+        <p:nvCxnSpPr>
+          <p:cNvPr id="42" name="Connettore 2 41">
+            <a:extLst>
+              <a:ext uri="{FF2B5EF4-FFF2-40B4-BE49-F238E27FC236}">
+                <a16:creationId xmlns:a16="http://schemas.microsoft.com/office/drawing/2014/main" id="{D3B730C8-1318-7EA8-18B6-8EA4BA0ACB68}"/>
+              </a:ext>
+            </a:extLst>
+          </p:cNvPr>
+          <p:cNvCxnSpPr>
+            <a:endCxn id="6" idx="2"/>
+          </p:cNvCxnSpPr>
+          <p:nvPr/>
+        </p:nvCxnSpPr>
+        <p:spPr>
+          <a:xfrm flipV="1">
+            <a:off x="4838700" y="5163979"/>
+            <a:ext cx="847405" cy="694743"/>
+          </a:xfrm>
+          <a:prstGeom prst="straightConnector1">
+            <a:avLst/>
+          </a:prstGeom>
+          <a:ln>
+            <a:tailEnd type="triangle"/>
+          </a:ln>
+        </p:spPr>
+        <p:style>
+          <a:lnRef idx="1">
+            <a:schemeClr val="accent1"/>
+          </a:lnRef>
+          <a:fillRef idx="0">
+            <a:schemeClr val="accent1"/>
+          </a:fillRef>
+          <a:effectRef idx="0">
+            <a:schemeClr val="accent1"/>
+          </a:effectRef>
+          <a:fontRef idx="minor">
+            <a:schemeClr val="tx1"/>
+          </a:fontRef>
+        </p:style>
+      </p:cxnSp>
+      <p:cxnSp>
+        <p:nvCxnSpPr>
+          <p:cNvPr id="44" name="Connettore 2 43">
+            <a:extLst>
+              <a:ext uri="{FF2B5EF4-FFF2-40B4-BE49-F238E27FC236}">
+                <a16:creationId xmlns:a16="http://schemas.microsoft.com/office/drawing/2014/main" id="{756379D4-ECD4-2889-BE49-0CBC02155824}"/>
+              </a:ext>
+            </a:extLst>
+          </p:cNvPr>
+          <p:cNvCxnSpPr>
+            <a:stCxn id="18" idx="3"/>
+            <a:endCxn id="13" idx="1"/>
+          </p:cNvCxnSpPr>
+          <p:nvPr/>
+        </p:nvCxnSpPr>
+        <p:spPr>
+          <a:xfrm>
+            <a:off x="5096778" y="6207972"/>
+            <a:ext cx="835403" cy="0"/>
+          </a:xfrm>
+          <a:prstGeom prst="straightConnector1">
+            <a:avLst/>
+          </a:prstGeom>
+          <a:ln>
+            <a:tailEnd type="triangle"/>
+          </a:ln>
+        </p:spPr>
+        <p:style>
+          <a:lnRef idx="1">
+            <a:schemeClr val="accent1"/>
+          </a:lnRef>
+          <a:fillRef idx="0">
+            <a:schemeClr val="accent1"/>
+          </a:fillRef>
+          <a:effectRef idx="0">
+            <a:schemeClr val="accent1"/>
+          </a:effectRef>
+          <a:fontRef idx="minor">
+            <a:schemeClr val="tx1"/>
+          </a:fontRef>
+        </p:style>
+      </p:cxnSp>
+      <p:cxnSp>
+        <p:nvCxnSpPr>
+          <p:cNvPr id="46" name="Connettore 2 45">
+            <a:extLst>
+              <a:ext uri="{FF2B5EF4-FFF2-40B4-BE49-F238E27FC236}">
+                <a16:creationId xmlns:a16="http://schemas.microsoft.com/office/drawing/2014/main" id="{88930D5C-EBDB-3119-5EC5-56263A28C4CB}"/>
+              </a:ext>
+            </a:extLst>
+          </p:cNvPr>
+          <p:cNvCxnSpPr>
+            <a:stCxn id="10" idx="2"/>
+            <a:endCxn id="7" idx="0"/>
+          </p:cNvCxnSpPr>
+          <p:nvPr/>
+        </p:nvCxnSpPr>
+        <p:spPr>
+          <a:xfrm>
+            <a:off x="10716819" y="3876703"/>
+            <a:ext cx="0" cy="1243087"/>
+          </a:xfrm>
+          <a:prstGeom prst="straightConnector1">
+            <a:avLst/>
+          </a:prstGeom>
+          <a:ln>
+            <a:tailEnd type="triangle"/>
+          </a:ln>
+        </p:spPr>
+        <p:style>
+          <a:lnRef idx="1">
+            <a:schemeClr val="accent1"/>
+          </a:lnRef>
+          <a:fillRef idx="0">
+            <a:schemeClr val="accent1"/>
+          </a:fillRef>
+          <a:effectRef idx="0">
+            <a:schemeClr val="accent1"/>
+          </a:effectRef>
+          <a:fontRef idx="minor">
+            <a:schemeClr val="tx1"/>
+          </a:fontRef>
+        </p:style>
+      </p:cxnSp>
+      <p:cxnSp>
+        <p:nvCxnSpPr>
+          <p:cNvPr id="48" name="Connettore 2 47">
+            <a:extLst>
+              <a:ext uri="{FF2B5EF4-FFF2-40B4-BE49-F238E27FC236}">
+                <a16:creationId xmlns:a16="http://schemas.microsoft.com/office/drawing/2014/main" id="{A4A5C4CE-8657-9A55-7FE9-680291639221}"/>
+              </a:ext>
+            </a:extLst>
+          </p:cNvPr>
+          <p:cNvCxnSpPr>
+            <a:stCxn id="8" idx="3"/>
+            <a:endCxn id="10" idx="1"/>
+          </p:cNvCxnSpPr>
+          <p:nvPr/>
+        </p:nvCxnSpPr>
+        <p:spPr>
+          <a:xfrm>
+            <a:off x="9073742" y="1738210"/>
+            <a:ext cx="703277" cy="1789243"/>
           </a:xfrm>
           <a:prstGeom prst="straightConnector1">
             <a:avLst/>
@@ -8249,190 +9441,23 @@
       </p:cxnSp>
       <p:cxnSp>
         <p:nvCxnSpPr>
-          <p:cNvPr id="17" name="Connettore 2 16">
-            <a:extLst>
-              <a:ext uri="{FF2B5EF4-FFF2-40B4-BE49-F238E27FC236}">
-                <a16:creationId xmlns:a16="http://schemas.microsoft.com/office/drawing/2014/main" id="{46632D3B-983B-4D04-B0E4-130632EF836F}"/>
+          <p:cNvPr id="50" name="Connettore 2 49">
+            <a:extLst>
+              <a:ext uri="{FF2B5EF4-FFF2-40B4-BE49-F238E27FC236}">
+                <a16:creationId xmlns:a16="http://schemas.microsoft.com/office/drawing/2014/main" id="{1606596A-1242-04B7-2C6A-6D91EF2794BC}"/>
               </a:ext>
             </a:extLst>
           </p:cNvPr>
           <p:cNvCxnSpPr>
-            <a:stCxn id="4" idx="0"/>
-          </p:cNvCxnSpPr>
-          <p:nvPr/>
-        </p:nvCxnSpPr>
-        <p:spPr>
-          <a:xfrm flipH="1" flipV="1">
-            <a:off x="3514987" y="1047225"/>
-            <a:ext cx="1139388" cy="529614"/>
-          </a:xfrm>
-          <a:prstGeom prst="straightConnector1">
-            <a:avLst/>
-          </a:prstGeom>
-          <a:ln>
-            <a:tailEnd type="triangle"/>
-          </a:ln>
-        </p:spPr>
-        <p:style>
-          <a:lnRef idx="1">
-            <a:schemeClr val="accent1"/>
-          </a:lnRef>
-          <a:fillRef idx="0">
-            <a:schemeClr val="accent1"/>
-          </a:fillRef>
-          <a:effectRef idx="0">
-            <a:schemeClr val="accent1"/>
-          </a:effectRef>
-          <a:fontRef idx="minor">
-            <a:schemeClr val="tx1"/>
-          </a:fontRef>
-        </p:style>
-      </p:cxnSp>
-      <p:cxnSp>
-        <p:nvCxnSpPr>
-          <p:cNvPr id="19" name="Connettore 2 18">
-            <a:extLst>
-              <a:ext uri="{FF2B5EF4-FFF2-40B4-BE49-F238E27FC236}">
-                <a16:creationId xmlns:a16="http://schemas.microsoft.com/office/drawing/2014/main" id="{1B43D01C-FC08-DD04-E275-A3154F9BFEDD}"/>
-              </a:ext>
-            </a:extLst>
-          </p:cNvPr>
-          <p:cNvCxnSpPr>
-            <a:stCxn id="12" idx="0"/>
-            <a:endCxn id="4" idx="2"/>
+            <a:stCxn id="9" idx="3"/>
+            <a:endCxn id="11" idx="1"/>
           </p:cNvCxnSpPr>
           <p:nvPr/>
         </p:nvCxnSpPr>
         <p:spPr>
           <a:xfrm flipV="1">
-            <a:off x="4654375" y="2275339"/>
-            <a:ext cx="0" cy="867214"/>
-          </a:xfrm>
-          <a:prstGeom prst="straightConnector1">
-            <a:avLst/>
-          </a:prstGeom>
-          <a:ln>
-            <a:tailEnd type="triangle"/>
-          </a:ln>
-        </p:spPr>
-        <p:style>
-          <a:lnRef idx="1">
-            <a:schemeClr val="accent1"/>
-          </a:lnRef>
-          <a:fillRef idx="0">
-            <a:schemeClr val="accent1"/>
-          </a:fillRef>
-          <a:effectRef idx="0">
-            <a:schemeClr val="accent1"/>
-          </a:effectRef>
-          <a:fontRef idx="minor">
-            <a:schemeClr val="tx1"/>
-          </a:fontRef>
-        </p:style>
-      </p:cxnSp>
-      <p:cxnSp>
-        <p:nvCxnSpPr>
-          <p:cNvPr id="21" name="Connettore 2 20">
-            <a:extLst>
-              <a:ext uri="{FF2B5EF4-FFF2-40B4-BE49-F238E27FC236}">
-                <a16:creationId xmlns:a16="http://schemas.microsoft.com/office/drawing/2014/main" id="{003F09C6-0916-01F5-17BB-B8130E467E1E}"/>
-              </a:ext>
-            </a:extLst>
-          </p:cNvPr>
-          <p:cNvCxnSpPr>
-            <a:cxnSpLocks/>
-            <a:stCxn id="13" idx="0"/>
-          </p:cNvCxnSpPr>
-          <p:nvPr/>
-        </p:nvCxnSpPr>
-        <p:spPr>
-          <a:xfrm flipV="1">
-            <a:off x="1065285" y="2275339"/>
-            <a:ext cx="109524" cy="2149856"/>
-          </a:xfrm>
-          <a:prstGeom prst="straightConnector1">
-            <a:avLst/>
-          </a:prstGeom>
-          <a:ln>
-            <a:tailEnd type="triangle"/>
-          </a:ln>
-        </p:spPr>
-        <p:style>
-          <a:lnRef idx="1">
-            <a:schemeClr val="accent1"/>
-          </a:lnRef>
-          <a:fillRef idx="0">
-            <a:schemeClr val="accent1"/>
-          </a:fillRef>
-          <a:effectRef idx="0">
-            <a:schemeClr val="accent1"/>
-          </a:effectRef>
-          <a:fontRef idx="minor">
-            <a:schemeClr val="tx1"/>
-          </a:fontRef>
-        </p:style>
-      </p:cxnSp>
-      <p:cxnSp>
-        <p:nvCxnSpPr>
-          <p:cNvPr id="24" name="Connettore 2 23">
-            <a:extLst>
-              <a:ext uri="{FF2B5EF4-FFF2-40B4-BE49-F238E27FC236}">
-                <a16:creationId xmlns:a16="http://schemas.microsoft.com/office/drawing/2014/main" id="{0565A98C-A350-9C7E-B6A7-62D19F324912}"/>
-              </a:ext>
-            </a:extLst>
-          </p:cNvPr>
-          <p:cNvCxnSpPr>
-            <a:cxnSpLocks/>
-            <a:stCxn id="5" idx="0"/>
-          </p:cNvCxnSpPr>
-          <p:nvPr/>
-        </p:nvCxnSpPr>
-        <p:spPr>
-          <a:xfrm flipV="1">
-            <a:off x="2233803" y="2275339"/>
-            <a:ext cx="0" cy="867214"/>
-          </a:xfrm>
-          <a:prstGeom prst="straightConnector1">
-            <a:avLst/>
-          </a:prstGeom>
-          <a:ln>
-            <a:tailEnd type="triangle"/>
-          </a:ln>
-        </p:spPr>
-        <p:style>
-          <a:lnRef idx="1">
-            <a:schemeClr val="accent1"/>
-          </a:lnRef>
-          <a:fillRef idx="0">
-            <a:schemeClr val="accent1"/>
-          </a:fillRef>
-          <a:effectRef idx="0">
-            <a:schemeClr val="accent1"/>
-          </a:effectRef>
-          <a:fontRef idx="minor">
-            <a:schemeClr val="tx1"/>
-          </a:fontRef>
-        </p:style>
-      </p:cxnSp>
-      <p:cxnSp>
-        <p:nvCxnSpPr>
-          <p:cNvPr id="27" name="Connettore 2 26">
-            <a:extLst>
-              <a:ext uri="{FF2B5EF4-FFF2-40B4-BE49-F238E27FC236}">
-                <a16:creationId xmlns:a16="http://schemas.microsoft.com/office/drawing/2014/main" id="{663475E8-9CE3-7EAE-8031-D605CA3961FF}"/>
-              </a:ext>
-            </a:extLst>
-          </p:cNvPr>
-          <p:cNvCxnSpPr>
-            <a:stCxn id="8" idx="3"/>
-            <a:endCxn id="10" idx="1"/>
-          </p:cNvCxnSpPr>
-          <p:nvPr/>
-        </p:nvCxnSpPr>
-        <p:spPr>
-          <a:xfrm>
             <a:off x="9073742" y="1738210"/>
-            <a:ext cx="703277" cy="1452693"/>
+            <a:ext cx="703277" cy="1789243"/>
           </a:xfrm>
           <a:prstGeom prst="straightConnector1">
             <a:avLst/>
@@ -8459,22 +9484,20 @@
       </p:cxnSp>
       <p:cxnSp>
         <p:nvCxnSpPr>
-          <p:cNvPr id="29" name="Connettore 2 28">
-            <a:extLst>
-              <a:ext uri="{FF2B5EF4-FFF2-40B4-BE49-F238E27FC236}">
-                <a16:creationId xmlns:a16="http://schemas.microsoft.com/office/drawing/2014/main" id="{F150E7E0-1160-69FB-4C9A-BAF8CC5C5E69}"/>
-              </a:ext>
-            </a:extLst>
-          </p:cNvPr>
-          <p:cNvCxnSpPr>
-            <a:stCxn id="11" idx="1"/>
-          </p:cNvCxnSpPr>
+          <p:cNvPr id="52" name="Connettore 2 51">
+            <a:extLst>
+              <a:ext uri="{FF2B5EF4-FFF2-40B4-BE49-F238E27FC236}">
+                <a16:creationId xmlns:a16="http://schemas.microsoft.com/office/drawing/2014/main" id="{4BE82A39-2C6D-F9D0-AB3F-32EB0219F7E0}"/>
+              </a:ext>
+            </a:extLst>
+          </p:cNvPr>
+          <p:cNvCxnSpPr/>
           <p:nvPr/>
         </p:nvCxnSpPr>
         <p:spPr>
-          <a:xfrm flipH="1">
-            <a:off x="9073742" y="1738210"/>
-            <a:ext cx="703277" cy="1452693"/>
+          <a:xfrm>
+            <a:off x="9073742" y="1536700"/>
+            <a:ext cx="703277" cy="0"/>
           </a:xfrm>
           <a:prstGeom prst="straightConnector1">
             <a:avLst/>
@@ -8501,25 +9524,64 @@
       </p:cxnSp>
       <p:cxnSp>
         <p:nvCxnSpPr>
-          <p:cNvPr id="31" name="Connettore 2 30">
-            <a:extLst>
-              <a:ext uri="{FF2B5EF4-FFF2-40B4-BE49-F238E27FC236}">
-                <a16:creationId xmlns:a16="http://schemas.microsoft.com/office/drawing/2014/main" id="{9A62D2A8-21DD-3426-CFCA-3A96FCB2CE4B}"/>
+          <p:cNvPr id="54" name="Connettore 2 53">
+            <a:extLst>
+              <a:ext uri="{FF2B5EF4-FFF2-40B4-BE49-F238E27FC236}">
+                <a16:creationId xmlns:a16="http://schemas.microsoft.com/office/drawing/2014/main" id="{35C00ADA-6E1B-95D9-4ED4-2F1255CF30C1}"/>
+              </a:ext>
+            </a:extLst>
+          </p:cNvPr>
+          <p:cNvCxnSpPr/>
+          <p:nvPr/>
+        </p:nvCxnSpPr>
+        <p:spPr>
+          <a:xfrm>
+            <a:off x="9073742" y="3778250"/>
+            <a:ext cx="703277" cy="0"/>
+          </a:xfrm>
+          <a:prstGeom prst="straightConnector1">
+            <a:avLst/>
+          </a:prstGeom>
+          <a:ln>
+            <a:headEnd type="triangle"/>
+            <a:tailEnd type="triangle"/>
+          </a:ln>
+        </p:spPr>
+        <p:style>
+          <a:lnRef idx="1">
+            <a:schemeClr val="accent1"/>
+          </a:lnRef>
+          <a:fillRef idx="0">
+            <a:schemeClr val="accent1"/>
+          </a:fillRef>
+          <a:effectRef idx="0">
+            <a:schemeClr val="accent1"/>
+          </a:effectRef>
+          <a:fontRef idx="minor">
+            <a:schemeClr val="tx1"/>
+          </a:fontRef>
+        </p:style>
+      </p:cxnSp>
+      <p:cxnSp>
+        <p:nvCxnSpPr>
+          <p:cNvPr id="56" name="Connettore a gomito 55">
+            <a:extLst>
+              <a:ext uri="{FF2B5EF4-FFF2-40B4-BE49-F238E27FC236}">
+                <a16:creationId xmlns:a16="http://schemas.microsoft.com/office/drawing/2014/main" id="{F01315B4-1EBD-42DD-C693-8F97858C1079}"/>
               </a:ext>
             </a:extLst>
           </p:cNvPr>
           <p:cNvCxnSpPr>
-            <a:stCxn id="7" idx="0"/>
-            <a:endCxn id="10" idx="2"/>
+            <a:endCxn id="8" idx="1"/>
           </p:cNvCxnSpPr>
           <p:nvPr/>
         </p:nvCxnSpPr>
         <p:spPr>
-          <a:xfrm flipV="1">
-            <a:off x="10716819" y="3540153"/>
-            <a:ext cx="0" cy="579833"/>
+          <a:xfrm rot="5400000" flipH="1" flipV="1">
+            <a:off x="3713758" y="2378338"/>
+            <a:ext cx="4120512" cy="2840256"/>
           </a:xfrm>
-          <a:prstGeom prst="straightConnector1">
+          <a:prstGeom prst="bentConnector2">
             <a:avLst/>
           </a:prstGeom>
           <a:ln>
@@ -8543,259 +9605,22 @@
       </p:cxnSp>
       <p:cxnSp>
         <p:nvCxnSpPr>
-          <p:cNvPr id="33" name="Connettore 2 32">
-            <a:extLst>
-              <a:ext uri="{FF2B5EF4-FFF2-40B4-BE49-F238E27FC236}">
-                <a16:creationId xmlns:a16="http://schemas.microsoft.com/office/drawing/2014/main" id="{06F5F246-D74D-C516-B533-2C54FDFF5586}"/>
+          <p:cNvPr id="19" name="Connettore 2 18">
+            <a:extLst>
+              <a:ext uri="{FF2B5EF4-FFF2-40B4-BE49-F238E27FC236}">
+                <a16:creationId xmlns:a16="http://schemas.microsoft.com/office/drawing/2014/main" id="{3712B361-9243-E1AB-2660-9404587C4592}"/>
               </a:ext>
             </a:extLst>
           </p:cNvPr>
           <p:cNvCxnSpPr>
-            <a:endCxn id="6" idx="3"/>
-          </p:cNvCxnSpPr>
-          <p:nvPr/>
-        </p:nvCxnSpPr>
-        <p:spPr>
-          <a:xfrm flipH="1">
-            <a:off x="7095805" y="3350267"/>
-            <a:ext cx="2681214" cy="1424178"/>
-          </a:xfrm>
-          <a:prstGeom prst="straightConnector1">
-            <a:avLst/>
-          </a:prstGeom>
-          <a:ln>
-            <a:tailEnd type="triangle"/>
-          </a:ln>
-        </p:spPr>
-        <p:style>
-          <a:lnRef idx="1">
-            <a:schemeClr val="accent1"/>
-          </a:lnRef>
-          <a:fillRef idx="0">
-            <a:schemeClr val="accent1"/>
-          </a:fillRef>
-          <a:effectRef idx="0">
-            <a:schemeClr val="accent1"/>
-          </a:effectRef>
-          <a:fontRef idx="minor">
-            <a:schemeClr val="tx1"/>
-          </a:fontRef>
-        </p:style>
-      </p:cxnSp>
-      <p:cxnSp>
-        <p:nvCxnSpPr>
-          <p:cNvPr id="35" name="Connettore diritto 34">
-            <a:extLst>
-              <a:ext uri="{FF2B5EF4-FFF2-40B4-BE49-F238E27FC236}">
-                <a16:creationId xmlns:a16="http://schemas.microsoft.com/office/drawing/2014/main" id="{0A288703-8B6A-A7D8-F781-68416012CF71}"/>
-              </a:ext>
-            </a:extLst>
-          </p:cNvPr>
-          <p:cNvCxnSpPr>
-            <a:stCxn id="6" idx="1"/>
-          </p:cNvCxnSpPr>
-          <p:nvPr/>
-        </p:nvCxnSpPr>
-        <p:spPr>
-          <a:xfrm flipH="1">
-            <a:off x="3514987" y="4774445"/>
-            <a:ext cx="1701218" cy="0"/>
-          </a:xfrm>
-          <a:prstGeom prst="line">
-            <a:avLst/>
-          </a:prstGeom>
-        </p:spPr>
-        <p:style>
-          <a:lnRef idx="1">
-            <a:schemeClr val="accent1"/>
-          </a:lnRef>
-          <a:fillRef idx="0">
-            <a:schemeClr val="accent1"/>
-          </a:fillRef>
-          <a:effectRef idx="0">
-            <a:schemeClr val="accent1"/>
-          </a:effectRef>
-          <a:fontRef idx="minor">
-            <a:schemeClr val="tx1"/>
-          </a:fontRef>
-        </p:style>
-      </p:cxnSp>
-      <p:cxnSp>
-        <p:nvCxnSpPr>
-          <p:cNvPr id="37" name="Connettore diritto 36">
-            <a:extLst>
-              <a:ext uri="{FF2B5EF4-FFF2-40B4-BE49-F238E27FC236}">
-                <a16:creationId xmlns:a16="http://schemas.microsoft.com/office/drawing/2014/main" id="{75293547-B6B5-D8DF-7AAE-9D2CD83C3802}"/>
-              </a:ext>
-            </a:extLst>
-          </p:cNvPr>
-          <p:cNvCxnSpPr/>
-          <p:nvPr/>
-        </p:nvCxnSpPr>
-        <p:spPr>
-          <a:xfrm flipV="1">
-            <a:off x="3514987" y="2617365"/>
-            <a:ext cx="0" cy="2157080"/>
-          </a:xfrm>
-          <a:prstGeom prst="line">
-            <a:avLst/>
-          </a:prstGeom>
-        </p:spPr>
-        <p:style>
-          <a:lnRef idx="1">
-            <a:schemeClr val="accent1"/>
-          </a:lnRef>
-          <a:fillRef idx="0">
-            <a:schemeClr val="accent1"/>
-          </a:fillRef>
-          <a:effectRef idx="0">
-            <a:schemeClr val="accent1"/>
-          </a:effectRef>
-          <a:fontRef idx="minor">
-            <a:schemeClr val="tx1"/>
-          </a:fontRef>
-        </p:style>
-      </p:cxnSp>
-      <p:cxnSp>
-        <p:nvCxnSpPr>
-          <p:cNvPr id="39" name="Connettore 2 38">
-            <a:extLst>
-              <a:ext uri="{FF2B5EF4-FFF2-40B4-BE49-F238E27FC236}">
-                <a16:creationId xmlns:a16="http://schemas.microsoft.com/office/drawing/2014/main" id="{B6CFB7BF-44F6-B23C-45A3-98C5EB5796AB}"/>
-              </a:ext>
-            </a:extLst>
-          </p:cNvPr>
-          <p:cNvCxnSpPr>
-            <a:cxnSpLocks/>
-          </p:cNvCxnSpPr>
-          <p:nvPr/>
-        </p:nvCxnSpPr>
-        <p:spPr>
-          <a:xfrm flipH="1" flipV="1">
-            <a:off x="2741569" y="2221772"/>
-            <a:ext cx="773418" cy="395593"/>
-          </a:xfrm>
-          <a:prstGeom prst="straightConnector1">
-            <a:avLst/>
-          </a:prstGeom>
-          <a:ln>
-            <a:tailEnd type="triangle"/>
-          </a:ln>
-        </p:spPr>
-        <p:style>
-          <a:lnRef idx="1">
-            <a:schemeClr val="accent1"/>
-          </a:lnRef>
-          <a:fillRef idx="0">
-            <a:schemeClr val="accent1"/>
-          </a:fillRef>
-          <a:effectRef idx="0">
-            <a:schemeClr val="accent1"/>
-          </a:effectRef>
-          <a:fontRef idx="minor">
-            <a:schemeClr val="tx1"/>
-          </a:fontRef>
-        </p:style>
-      </p:cxnSp>
-      <p:cxnSp>
-        <p:nvCxnSpPr>
-          <p:cNvPr id="42" name="Connettore diritto 41">
-            <a:extLst>
-              <a:ext uri="{FF2B5EF4-FFF2-40B4-BE49-F238E27FC236}">
-                <a16:creationId xmlns:a16="http://schemas.microsoft.com/office/drawing/2014/main" id="{D30A7A4B-F864-810F-0A36-2A15A8E586CF}"/>
-              </a:ext>
-            </a:extLst>
-          </p:cNvPr>
-          <p:cNvCxnSpPr>
-            <a:cxnSpLocks/>
-            <a:stCxn id="3" idx="3"/>
-          </p:cNvCxnSpPr>
-          <p:nvPr/>
-        </p:nvCxnSpPr>
-        <p:spPr>
-          <a:xfrm flipV="1">
-            <a:off x="2708362" y="618586"/>
-            <a:ext cx="2775941" cy="1307503"/>
-          </a:xfrm>
-          <a:prstGeom prst="line">
-            <a:avLst/>
-          </a:prstGeom>
-        </p:spPr>
-        <p:style>
-          <a:lnRef idx="1">
-            <a:schemeClr val="accent1"/>
-          </a:lnRef>
-          <a:fillRef idx="0">
-            <a:schemeClr val="accent1"/>
-          </a:fillRef>
-          <a:effectRef idx="0">
-            <a:schemeClr val="accent1"/>
-          </a:effectRef>
-          <a:fontRef idx="minor">
-            <a:schemeClr val="tx1"/>
-          </a:fontRef>
-        </p:style>
-      </p:cxnSp>
-      <p:cxnSp>
-        <p:nvCxnSpPr>
-          <p:cNvPr id="45" name="Connettore 2 44">
-            <a:extLst>
-              <a:ext uri="{FF2B5EF4-FFF2-40B4-BE49-F238E27FC236}">
-                <a16:creationId xmlns:a16="http://schemas.microsoft.com/office/drawing/2014/main" id="{DF0F08B6-AA96-1898-5134-6F50CDDD3EA1}"/>
-              </a:ext>
-            </a:extLst>
-          </p:cNvPr>
-          <p:cNvCxnSpPr>
-            <a:endCxn id="8" idx="1"/>
-          </p:cNvCxnSpPr>
-          <p:nvPr/>
-        </p:nvCxnSpPr>
-        <p:spPr>
-          <a:xfrm>
-            <a:off x="5484303" y="631017"/>
-            <a:ext cx="1709839" cy="1107193"/>
-          </a:xfrm>
-          <a:prstGeom prst="straightConnector1">
-            <a:avLst/>
-          </a:prstGeom>
-          <a:ln>
-            <a:tailEnd type="triangle"/>
-          </a:ln>
-        </p:spPr>
-        <p:style>
-          <a:lnRef idx="1">
-            <a:schemeClr val="accent1"/>
-          </a:lnRef>
-          <a:fillRef idx="0">
-            <a:schemeClr val="accent1"/>
-          </a:fillRef>
-          <a:effectRef idx="0">
-            <a:schemeClr val="accent1"/>
-          </a:effectRef>
-          <a:fontRef idx="minor">
-            <a:schemeClr val="tx1"/>
-          </a:fontRef>
-        </p:style>
-      </p:cxnSp>
-      <p:cxnSp>
-        <p:nvCxnSpPr>
-          <p:cNvPr id="47" name="Connettore 2 46">
-            <a:extLst>
-              <a:ext uri="{FF2B5EF4-FFF2-40B4-BE49-F238E27FC236}">
-                <a16:creationId xmlns:a16="http://schemas.microsoft.com/office/drawing/2014/main" id="{7E558675-CBB7-9495-36A5-25D636A0B8F4}"/>
-              </a:ext>
-            </a:extLst>
-          </p:cNvPr>
-          <p:cNvCxnSpPr>
-            <a:cxnSpLocks/>
             <a:endCxn id="9" idx="1"/>
           </p:cNvCxnSpPr>
           <p:nvPr/>
         </p:nvCxnSpPr>
         <p:spPr>
           <a:xfrm>
-            <a:off x="5484303" y="643447"/>
-            <a:ext cx="1709839" cy="2547456"/>
+            <a:off x="4353886" y="3527453"/>
+            <a:ext cx="2840256" cy="0"/>
           </a:xfrm>
           <a:prstGeom prst="straightConnector1">
             <a:avLst/>

</xml_diff>